<commit_message>
Some minor PPT updates
</commit_message>
<xml_diff>
--- a/PowerPoint/GettingStartedWithNodejs.pptx
+++ b/PowerPoint/GettingStartedWithNodejs.pptx
@@ -7,11 +7,12 @@
   <p:sldIdLst>
     <p:sldId id="256" r:id="rId2"/>
     <p:sldId id="257" r:id="rId3"/>
-    <p:sldId id="258" r:id="rId4"/>
-    <p:sldId id="259" r:id="rId5"/>
-    <p:sldId id="260" r:id="rId6"/>
-    <p:sldId id="261" r:id="rId7"/>
-    <p:sldId id="262" r:id="rId8"/>
+    <p:sldId id="263" r:id="rId4"/>
+    <p:sldId id="258" r:id="rId5"/>
+    <p:sldId id="259" r:id="rId6"/>
+    <p:sldId id="260" r:id="rId7"/>
+    <p:sldId id="261" r:id="rId8"/>
+    <p:sldId id="262" r:id="rId9"/>
   </p:sldIdLst>
   <p:sldSz cx="9144000" cy="6858000" type="screen4x3"/>
   <p:notesSz cx="7010400" cy="9296400"/>
@@ -308,7 +309,7 @@
             <a:fld id="{04AF466F-BDA4-4F18-9C7B-FF0A9A1B0E80}" type="datetime1">
               <a:rPr lang="en-US" smtClean="0"/>
               <a:pPr/>
-              <a:t>6/26/11</a:t>
+              <a:t>7/28/11</a:t>
             </a:fld>
             <a:endParaRPr lang="en-US"/>
           </a:p>
@@ -475,7 +476,7 @@
             <a:fld id="{58FB4290-6522-4139-852E-05BD9E7F0D2E}" type="datetime1">
               <a:rPr lang="en-US" smtClean="0"/>
               <a:pPr/>
-              <a:t>6/26/11</a:t>
+              <a:t>7/28/11</a:t>
             </a:fld>
             <a:endParaRPr lang="en-US"/>
           </a:p>
@@ -652,7 +653,7 @@
             <a:fld id="{AAB955F9-81EA-47C5-8059-9E5C2B437C70}" type="datetime1">
               <a:rPr lang="en-US" smtClean="0"/>
               <a:pPr/>
-              <a:t>6/26/11</a:t>
+              <a:t>7/28/11</a:t>
             </a:fld>
             <a:endParaRPr lang="en-US"/>
           </a:p>
@@ -819,7 +820,7 @@
             <a:fld id="{1CEF607B-A47E-422C-9BEF-122CCDB7C526}" type="datetime1">
               <a:rPr lang="en-US" smtClean="0"/>
               <a:pPr/>
-              <a:t>6/26/11</a:t>
+              <a:t>7/28/11</a:t>
             </a:fld>
             <a:endParaRPr lang="en-US"/>
           </a:p>
@@ -1062,7 +1063,7 @@
             <a:fld id="{63A9A7CB-BEE6-4F99-898E-913F06E8E125}" type="datetime1">
               <a:rPr lang="en-US" smtClean="0"/>
               <a:pPr/>
-              <a:t>6/26/11</a:t>
+              <a:t>7/28/11</a:t>
             </a:fld>
             <a:endParaRPr lang="en-US"/>
           </a:p>
@@ -1347,7 +1348,7 @@
             <a:fld id="{B6EE300C-6FC5-4FC3-AF1A-075E4F50620D}" type="datetime1">
               <a:rPr lang="en-US" smtClean="0"/>
               <a:pPr/>
-              <a:t>6/26/11</a:t>
+              <a:t>7/28/11</a:t>
             </a:fld>
             <a:endParaRPr lang="en-US"/>
           </a:p>
@@ -1778,7 +1779,7 @@
             <a:fld id="{F50D295D-4A77-4DEB-B04C-9F4282A8BC04}" type="datetime1">
               <a:rPr lang="en-US" smtClean="0"/>
               <a:pPr/>
-              <a:t>6/26/11</a:t>
+              <a:t>7/28/11</a:t>
             </a:fld>
             <a:endParaRPr lang="en-US"/>
           </a:p>
@@ -1893,7 +1894,7 @@
             <a:fld id="{02B28685-4D0C-42D5-8013-B5904CD1FCBC}" type="datetime1">
               <a:rPr lang="en-US" smtClean="0"/>
               <a:pPr/>
-              <a:t>6/26/11</a:t>
+              <a:t>7/28/11</a:t>
             </a:fld>
             <a:endParaRPr lang="en-US"/>
           </a:p>
@@ -1985,7 +1986,7 @@
             <a:fld id="{FDF226C0-9885-4BA9-BBFA-A52CBFEBB775}" type="datetime1">
               <a:rPr lang="en-US" smtClean="0"/>
               <a:pPr/>
-              <a:t>6/26/11</a:t>
+              <a:t>7/28/11</a:t>
             </a:fld>
             <a:endParaRPr lang="en-US"/>
           </a:p>
@@ -2176,7 +2177,7 @@
             <a:fld id="{EBEE1B38-C5EB-4D66-9137-0AFE9CDEDE8F}" type="datetime1">
               <a:rPr lang="en-US" smtClean="0"/>
               <a:pPr/>
-              <a:t>6/26/11</a:t>
+              <a:t>7/28/11</a:t>
             </a:fld>
             <a:endParaRPr lang="en-US"/>
           </a:p>
@@ -2496,7 +2497,7 @@
             <a:fld id="{327B613C-1AD7-49D3-885D-F654C5CDBAA6}" type="datetime1">
               <a:rPr lang="en-US" smtClean="0"/>
               <a:pPr/>
-              <a:t>6/26/11</a:t>
+              <a:t>7/28/11</a:t>
             </a:fld>
             <a:endParaRPr lang="en-US" dirty="0"/>
           </a:p>
@@ -2878,7 +2879,7 @@
             <a:fld id="{327B613C-1AD7-49D3-885D-F654C5CDBAA6}" type="datetime1">
               <a:rPr lang="en-US" smtClean="0"/>
               <a:pPr/>
-              <a:t>6/26/11</a:t>
+              <a:t>7/28/11</a:t>
             </a:fld>
             <a:endParaRPr lang="en-US" dirty="0"/>
           </a:p>
@@ -3557,20 +3558,492 @@
             <p:ph type="title"/>
           </p:nvPr>
         </p:nvSpPr>
+        <p:spPr/>
+        <p:txBody>
+          <a:bodyPr/>
+          <a:lstStyle/>
+          <a:p>
+            <a:r>
+              <a:rPr lang="en-US" dirty="0" smtClean="0"/>
+              <a:t>What is an Event Loop?</a:t>
+            </a:r>
+            <a:endParaRPr lang="en-US" dirty="0"/>
+          </a:p>
+        </p:txBody>
+      </p:sp>
+      <p:cxnSp>
+        <p:nvCxnSpPr>
+          <p:cNvPr id="5" name="Straight Arrow Connector 4"/>
+          <p:cNvCxnSpPr/>
+          <p:nvPr/>
+        </p:nvCxnSpPr>
         <p:spPr>
           <a:xfrm>
-            <a:off x="457200" y="2721339"/>
-            <a:ext cx="7620000" cy="1143000"/>
+            <a:off x="485468" y="4000500"/>
+            <a:ext cx="7563810" cy="0"/>
           </a:xfrm>
+          <a:prstGeom prst="straightConnector1">
+            <a:avLst/>
+          </a:prstGeom>
+          <a:ln w="76200" cmpd="sng">
+            <a:tailEnd type="arrow"/>
+          </a:ln>
         </p:spPr>
-        <p:txBody>
-          <a:bodyPr/>
+        <p:style>
+          <a:lnRef idx="2">
+            <a:schemeClr val="dk1"/>
+          </a:lnRef>
+          <a:fillRef idx="0">
+            <a:schemeClr val="dk1"/>
+          </a:fillRef>
+          <a:effectRef idx="1">
+            <a:schemeClr val="dk1"/>
+          </a:effectRef>
+          <a:fontRef idx="minor">
+            <a:schemeClr val="tx1"/>
+          </a:fontRef>
+        </p:style>
+      </p:cxnSp>
+      <p:sp>
+        <p:nvSpPr>
+          <p:cNvPr id="11" name="TextBox 10"/>
+          <p:cNvSpPr txBox="1"/>
+          <p:nvPr/>
+        </p:nvSpPr>
+        <p:spPr>
+          <a:xfrm>
+            <a:off x="3473647" y="4000500"/>
+            <a:ext cx="1363312" cy="369332"/>
+          </a:xfrm>
+          <a:prstGeom prst="rect">
+            <a:avLst/>
+          </a:prstGeom>
+          <a:noFill/>
+        </p:spPr>
+        <p:txBody>
+          <a:bodyPr wrap="square" rtlCol="0">
+            <a:spAutoFit/>
+          </a:bodyPr>
           <a:lstStyle/>
           <a:p>
             <a:pPr algn="ctr"/>
             <a:r>
               <a:rPr lang="en-US" dirty="0" smtClean="0"/>
-              <a:t>JavaScript?  Really??</a:t>
+              <a:t>Event Loop</a:t>
+            </a:r>
+          </a:p>
+        </p:txBody>
+      </p:sp>
+      <p:sp>
+        <p:nvSpPr>
+          <p:cNvPr id="12" name="Rounded Rectangle 11"/>
+          <p:cNvSpPr/>
+          <p:nvPr/>
+        </p:nvSpPr>
+        <p:spPr>
+          <a:xfrm>
+            <a:off x="1515377" y="1858372"/>
+            <a:ext cx="1167220" cy="719069"/>
+          </a:xfrm>
+          <a:prstGeom prst="roundRect">
+            <a:avLst/>
+          </a:prstGeom>
+        </p:spPr>
+        <p:style>
+          <a:lnRef idx="1">
+            <a:schemeClr val="accent1"/>
+          </a:lnRef>
+          <a:fillRef idx="3">
+            <a:schemeClr val="accent1"/>
+          </a:fillRef>
+          <a:effectRef idx="2">
+            <a:schemeClr val="accent1"/>
+          </a:effectRef>
+          <a:fontRef idx="minor">
+            <a:schemeClr val="lt1"/>
+          </a:fontRef>
+        </p:style>
+        <p:txBody>
+          <a:bodyPr rtlCol="0" anchor="ctr"/>
+          <a:lstStyle/>
+          <a:p>
+            <a:pPr algn="ctr"/>
+            <a:r>
+              <a:rPr lang="en-US" sz="2000" dirty="0" smtClean="0"/>
+              <a:t>Client A</a:t>
+            </a:r>
+            <a:endParaRPr lang="en-US" sz="2000" dirty="0"/>
+          </a:p>
+        </p:txBody>
+      </p:sp>
+      <p:cxnSp>
+        <p:nvCxnSpPr>
+          <p:cNvPr id="14" name="Straight Arrow Connector 13"/>
+          <p:cNvCxnSpPr/>
+          <p:nvPr/>
+        </p:nvCxnSpPr>
+        <p:spPr>
+          <a:xfrm>
+            <a:off x="2141429" y="2642811"/>
+            <a:ext cx="0" cy="1260704"/>
+          </a:xfrm>
+          <a:prstGeom prst="straightConnector1">
+            <a:avLst/>
+          </a:prstGeom>
+          <a:ln>
+            <a:tailEnd type="arrow"/>
+          </a:ln>
+        </p:spPr>
+        <p:style>
+          <a:lnRef idx="2">
+            <a:schemeClr val="accent1"/>
+          </a:lnRef>
+          <a:fillRef idx="0">
+            <a:schemeClr val="accent1"/>
+          </a:fillRef>
+          <a:effectRef idx="1">
+            <a:schemeClr val="accent1"/>
+          </a:effectRef>
+          <a:fontRef idx="minor">
+            <a:schemeClr val="tx1"/>
+          </a:fontRef>
+        </p:style>
+      </p:cxnSp>
+      <p:sp>
+        <p:nvSpPr>
+          <p:cNvPr id="19" name="TextBox 18"/>
+          <p:cNvSpPr txBox="1"/>
+          <p:nvPr/>
+        </p:nvSpPr>
+        <p:spPr>
+          <a:xfrm>
+            <a:off x="391508" y="2998139"/>
+            <a:ext cx="1995069" cy="307777"/>
+          </a:xfrm>
+          <a:prstGeom prst="rect">
+            <a:avLst/>
+          </a:prstGeom>
+          <a:noFill/>
+        </p:spPr>
+        <p:txBody>
+          <a:bodyPr wrap="square" rtlCol="0">
+            <a:spAutoFit/>
+          </a:bodyPr>
+          <a:lstStyle/>
+          <a:p>
+            <a:r>
+              <a:rPr lang="en-US" sz="1400" dirty="0" err="1"/>
+              <a:t>R</a:t>
+            </a:r>
+            <a:r>
+              <a:rPr lang="en-US" sz="1400" dirty="0" err="1" smtClean="0"/>
+              <a:t>eadFile</a:t>
+            </a:r>
+            <a:r>
+              <a:rPr lang="en-US" sz="1400" dirty="0" smtClean="0"/>
+              <a:t>(callback);</a:t>
+            </a:r>
+            <a:endParaRPr lang="en-US" sz="1400" dirty="0"/>
+          </a:p>
+        </p:txBody>
+      </p:sp>
+      <p:cxnSp>
+        <p:nvCxnSpPr>
+          <p:cNvPr id="21" name="Curved Connector 20"/>
+          <p:cNvCxnSpPr>
+            <a:endCxn id="26" idx="1"/>
+          </p:cNvCxnSpPr>
+          <p:nvPr/>
+        </p:nvCxnSpPr>
+        <p:spPr>
+          <a:xfrm flipV="1">
+            <a:off x="2253501" y="3317999"/>
+            <a:ext cx="744793" cy="585516"/>
+          </a:xfrm>
+          <a:prstGeom prst="curvedConnector3">
+            <a:avLst>
+              <a:gd name="adj1" fmla="val 50000"/>
+            </a:avLst>
+          </a:prstGeom>
+          <a:ln>
+            <a:tailEnd type="arrow"/>
+          </a:ln>
+        </p:spPr>
+        <p:style>
+          <a:lnRef idx="2">
+            <a:schemeClr val="accent1"/>
+          </a:lnRef>
+          <a:fillRef idx="0">
+            <a:schemeClr val="accent1"/>
+          </a:fillRef>
+          <a:effectRef idx="1">
+            <a:schemeClr val="accent1"/>
+          </a:effectRef>
+          <a:fontRef idx="minor">
+            <a:schemeClr val="tx1"/>
+          </a:fontRef>
+        </p:style>
+      </p:cxnSp>
+      <p:sp>
+        <p:nvSpPr>
+          <p:cNvPr id="26" name="Rounded Rectangle 25"/>
+          <p:cNvSpPr/>
+          <p:nvPr/>
+        </p:nvSpPr>
+        <p:spPr>
+          <a:xfrm>
+            <a:off x="2998294" y="2940844"/>
+            <a:ext cx="1031251" cy="754309"/>
+          </a:xfrm>
+          <a:prstGeom prst="roundRect">
+            <a:avLst/>
+          </a:prstGeom>
+        </p:spPr>
+        <p:style>
+          <a:lnRef idx="1">
+            <a:schemeClr val="accent1"/>
+          </a:lnRef>
+          <a:fillRef idx="3">
+            <a:schemeClr val="accent1"/>
+          </a:fillRef>
+          <a:effectRef idx="2">
+            <a:schemeClr val="accent1"/>
+          </a:effectRef>
+          <a:fontRef idx="minor">
+            <a:schemeClr val="lt1"/>
+          </a:fontRef>
+        </p:style>
+        <p:txBody>
+          <a:bodyPr rtlCol="0" anchor="ctr"/>
+          <a:lstStyle/>
+          <a:p>
+            <a:pPr algn="ctr"/>
+            <a:r>
+              <a:rPr lang="en-US" dirty="0" smtClean="0"/>
+              <a:t>OS Thread</a:t>
+            </a:r>
+            <a:endParaRPr lang="en-US" dirty="0"/>
+          </a:p>
+        </p:txBody>
+      </p:sp>
+      <p:cxnSp>
+        <p:nvCxnSpPr>
+          <p:cNvPr id="29" name="Curved Connector 28"/>
+          <p:cNvCxnSpPr>
+            <a:stCxn id="26" idx="0"/>
+            <a:endCxn id="12" idx="3"/>
+          </p:cNvCxnSpPr>
+          <p:nvPr/>
+        </p:nvCxnSpPr>
+        <p:spPr>
+          <a:xfrm rot="16200000" flipV="1">
+            <a:off x="2736791" y="2163714"/>
+            <a:ext cx="722937" cy="831323"/>
+          </a:xfrm>
+          <a:prstGeom prst="curvedConnector2">
+            <a:avLst/>
+          </a:prstGeom>
+          <a:ln>
+            <a:tailEnd type="arrow"/>
+          </a:ln>
+        </p:spPr>
+        <p:style>
+          <a:lnRef idx="2">
+            <a:schemeClr val="accent1"/>
+          </a:lnRef>
+          <a:fillRef idx="0">
+            <a:schemeClr val="accent1"/>
+          </a:fillRef>
+          <a:effectRef idx="1">
+            <a:schemeClr val="accent1"/>
+          </a:effectRef>
+          <a:fontRef idx="minor">
+            <a:schemeClr val="tx1"/>
+          </a:fontRef>
+        </p:style>
+      </p:cxnSp>
+      <p:sp>
+        <p:nvSpPr>
+          <p:cNvPr id="30" name="TextBox 29"/>
+          <p:cNvSpPr txBox="1"/>
+          <p:nvPr/>
+        </p:nvSpPr>
+        <p:spPr>
+          <a:xfrm>
+            <a:off x="3189275" y="2148348"/>
+            <a:ext cx="1900170" cy="307777"/>
+          </a:xfrm>
+          <a:prstGeom prst="rect">
+            <a:avLst/>
+          </a:prstGeom>
+          <a:noFill/>
+        </p:spPr>
+        <p:txBody>
+          <a:bodyPr wrap="square" rtlCol="0">
+            <a:spAutoFit/>
+          </a:bodyPr>
+          <a:lstStyle/>
+          <a:p>
+            <a:r>
+              <a:rPr lang="en-US" sz="1400" dirty="0"/>
+              <a:t>c</a:t>
+            </a:r>
+            <a:r>
+              <a:rPr lang="en-US" sz="1400" dirty="0" smtClean="0"/>
+              <a:t>allback(</a:t>
+            </a:r>
+            <a:r>
+              <a:rPr lang="en-US" sz="1400" dirty="0" err="1" smtClean="0"/>
+              <a:t>err,result</a:t>
+            </a:r>
+            <a:r>
+              <a:rPr lang="en-US" sz="1400" dirty="0" smtClean="0"/>
+              <a:t>);</a:t>
+            </a:r>
+            <a:endParaRPr lang="en-US" sz="1400" dirty="0"/>
+          </a:p>
+        </p:txBody>
+      </p:sp>
+      <p:sp>
+        <p:nvSpPr>
+          <p:cNvPr id="37" name="Rounded Rectangular Callout 36"/>
+          <p:cNvSpPr/>
+          <p:nvPr/>
+        </p:nvSpPr>
+        <p:spPr>
+          <a:xfrm>
+            <a:off x="4583351" y="4678620"/>
+            <a:ext cx="1537328" cy="754309"/>
+          </a:xfrm>
+          <a:prstGeom prst="wedgeRoundRectCallout">
+            <a:avLst>
+              <a:gd name="adj1" fmla="val -51889"/>
+              <a:gd name="adj2" fmla="val -90664"/>
+              <a:gd name="adj3" fmla="val 16667"/>
+            </a:avLst>
+          </a:prstGeom>
+        </p:spPr>
+        <p:style>
+          <a:lnRef idx="2">
+            <a:schemeClr val="accent3">
+              <a:shade val="50000"/>
+            </a:schemeClr>
+          </a:lnRef>
+          <a:fillRef idx="1">
+            <a:schemeClr val="accent3"/>
+          </a:fillRef>
+          <a:effectRef idx="0">
+            <a:schemeClr val="accent3"/>
+          </a:effectRef>
+          <a:fontRef idx="minor">
+            <a:schemeClr val="lt1"/>
+          </a:fontRef>
+        </p:style>
+        <p:txBody>
+          <a:bodyPr rtlCol="0" anchor="ctr"/>
+          <a:lstStyle/>
+          <a:p>
+            <a:pPr algn="ctr"/>
+            <a:r>
+              <a:rPr lang="en-US" dirty="0" err="1" smtClean="0"/>
+              <a:t>libev</a:t>
+            </a:r>
+            <a:endParaRPr lang="en-US" dirty="0"/>
+          </a:p>
+        </p:txBody>
+      </p:sp>
+      <p:sp>
+        <p:nvSpPr>
+          <p:cNvPr id="38" name="Line Callout 1 37"/>
+          <p:cNvSpPr/>
+          <p:nvPr/>
+        </p:nvSpPr>
+        <p:spPr>
+          <a:xfrm>
+            <a:off x="789669" y="4678619"/>
+            <a:ext cx="1425025" cy="754309"/>
+          </a:xfrm>
+          <a:prstGeom prst="borderCallout1">
+            <a:avLst>
+              <a:gd name="adj1" fmla="val 10441"/>
+              <a:gd name="adj2" fmla="val 78205"/>
+              <a:gd name="adj3" fmla="val -91268"/>
+              <a:gd name="adj4" fmla="val 97596"/>
+            </a:avLst>
+          </a:prstGeom>
+        </p:spPr>
+        <p:style>
+          <a:lnRef idx="2">
+            <a:schemeClr val="accent3">
+              <a:shade val="50000"/>
+            </a:schemeClr>
+          </a:lnRef>
+          <a:fillRef idx="1">
+            <a:schemeClr val="accent3"/>
+          </a:fillRef>
+          <a:effectRef idx="0">
+            <a:schemeClr val="accent3"/>
+          </a:effectRef>
+          <a:fontRef idx="minor">
+            <a:schemeClr val="lt1"/>
+          </a:fontRef>
+        </p:style>
+        <p:txBody>
+          <a:bodyPr rtlCol="0" anchor="ctr"/>
+          <a:lstStyle/>
+          <a:p>
+            <a:pPr algn="ctr"/>
+            <a:r>
+              <a:rPr lang="en-US" sz="1200" dirty="0" smtClean="0"/>
+              <a:t>I/O operations dispatched to OS thread</a:t>
+            </a:r>
+            <a:endParaRPr lang="en-US" sz="1200" dirty="0"/>
+          </a:p>
+        </p:txBody>
+      </p:sp>
+      <p:sp>
+        <p:nvSpPr>
+          <p:cNvPr id="39" name="Rounded Rectangular Callout 38"/>
+          <p:cNvSpPr/>
+          <p:nvPr/>
+        </p:nvSpPr>
+        <p:spPr>
+          <a:xfrm>
+            <a:off x="4898465" y="2577441"/>
+            <a:ext cx="1508684" cy="707149"/>
+          </a:xfrm>
+          <a:prstGeom prst="wedgeRoundRectCallout">
+            <a:avLst>
+              <a:gd name="adj1" fmla="val -101479"/>
+              <a:gd name="adj2" fmla="val 62500"/>
+              <a:gd name="adj3" fmla="val 16667"/>
+            </a:avLst>
+          </a:prstGeom>
+        </p:spPr>
+        <p:style>
+          <a:lnRef idx="2">
+            <a:schemeClr val="accent3">
+              <a:shade val="50000"/>
+            </a:schemeClr>
+          </a:lnRef>
+          <a:fillRef idx="1">
+            <a:schemeClr val="accent3"/>
+          </a:fillRef>
+          <a:effectRef idx="0">
+            <a:schemeClr val="accent3"/>
+          </a:effectRef>
+          <a:fontRef idx="minor">
+            <a:schemeClr val="lt1"/>
+          </a:fontRef>
+        </p:style>
+        <p:txBody>
+          <a:bodyPr rtlCol="0" anchor="ctr"/>
+          <a:lstStyle/>
+          <a:p>
+            <a:pPr algn="ctr"/>
+            <a:r>
+              <a:rPr lang="en-US" dirty="0" err="1" smtClean="0"/>
+              <a:t>libeio</a:t>
             </a:r>
             <a:endParaRPr lang="en-US" dirty="0"/>
           </a:p>
@@ -3579,7 +4052,7 @@
     </p:spTree>
     <p:extLst>
       <p:ext uri="{BB962C8B-B14F-4D97-AF65-F5344CB8AC3E}">
-        <p14:creationId xmlns:p14="http://schemas.microsoft.com/office/powerpoint/2010/main" val="1044814785"/>
+        <p14:creationId xmlns:p14="http://schemas.microsoft.com/office/powerpoint/2010/main" val="2636722769"/>
       </p:ext>
     </p:extLst>
   </p:cSld>
@@ -3623,6 +4096,72 @@
             <p:ph type="title"/>
           </p:nvPr>
         </p:nvSpPr>
+        <p:spPr>
+          <a:xfrm>
+            <a:off x="457200" y="2721339"/>
+            <a:ext cx="7620000" cy="1143000"/>
+          </a:xfrm>
+        </p:spPr>
+        <p:txBody>
+          <a:bodyPr/>
+          <a:lstStyle/>
+          <a:p>
+            <a:pPr algn="ctr"/>
+            <a:r>
+              <a:rPr lang="en-US" dirty="0" smtClean="0"/>
+              <a:t>JavaScript?  Really??</a:t>
+            </a:r>
+            <a:endParaRPr lang="en-US" dirty="0"/>
+          </a:p>
+        </p:txBody>
+      </p:sp>
+    </p:spTree>
+    <p:extLst>
+      <p:ext uri="{BB962C8B-B14F-4D97-AF65-F5344CB8AC3E}">
+        <p14:creationId xmlns:p14="http://schemas.microsoft.com/office/powerpoint/2010/main" val="1044814785"/>
+      </p:ext>
+    </p:extLst>
+  </p:cSld>
+  <p:clrMapOvr>
+    <a:masterClrMapping/>
+  </p:clrMapOvr>
+  <p:timing>
+    <p:tnLst>
+      <p:par>
+        <p:cTn xmlns:p14="http://schemas.microsoft.com/office/powerpoint/2010/main" id="1" dur="indefinite" restart="never" nodeType="tmRoot"/>
+      </p:par>
+    </p:tnLst>
+  </p:timing>
+</p:sld>
+</file>
+
+<file path=ppt/slides/slide5.xml><?xml version="1.0" encoding="utf-8"?>
+<p:sld xmlns:a="http://schemas.openxmlformats.org/drawingml/2006/main" xmlns:r="http://schemas.openxmlformats.org/officeDocument/2006/relationships" xmlns:p="http://schemas.openxmlformats.org/presentationml/2006/main">
+  <p:cSld>
+    <p:spTree>
+      <p:nvGrpSpPr>
+        <p:cNvPr id="1" name=""/>
+        <p:cNvGrpSpPr/>
+        <p:nvPr/>
+      </p:nvGrpSpPr>
+      <p:grpSpPr>
+        <a:xfrm>
+          <a:off x="0" y="0"/>
+          <a:ext cx="0" cy="0"/>
+          <a:chOff x="0" y="0"/>
+          <a:chExt cx="0" cy="0"/>
+        </a:xfrm>
+      </p:grpSpPr>
+      <p:sp>
+        <p:nvSpPr>
+          <p:cNvPr id="2" name="Title 1"/>
+          <p:cNvSpPr>
+            <a:spLocks noGrp="1"/>
+          </p:cNvSpPr>
+          <p:nvPr>
+            <p:ph type="title"/>
+          </p:nvPr>
+        </p:nvSpPr>
         <p:spPr/>
         <p:txBody>
           <a:bodyPr/>
@@ -3758,7 +4297,7 @@
 </p:sld>
 </file>
 
-<file path=ppt/slides/slide5.xml><?xml version="1.0" encoding="utf-8"?>
+<file path=ppt/slides/slide6.xml><?xml version="1.0" encoding="utf-8"?>
 <p:sld xmlns:a="http://schemas.openxmlformats.org/drawingml/2006/main" xmlns:r="http://schemas.openxmlformats.org/officeDocument/2006/relationships" xmlns:p="http://schemas.openxmlformats.org/presentationml/2006/main">
   <p:cSld>
     <p:spTree>
@@ -4984,7 +5523,7 @@
 </p:sld>
 </file>
 
-<file path=ppt/slides/slide6.xml><?xml version="1.0" encoding="utf-8"?>
+<file path=ppt/slides/slide7.xml><?xml version="1.0" encoding="utf-8"?>
 <p:sld xmlns:a="http://schemas.openxmlformats.org/drawingml/2006/main" xmlns:r="http://schemas.openxmlformats.org/officeDocument/2006/relationships" xmlns:p="http://schemas.openxmlformats.org/presentationml/2006/main">
   <p:cSld>
     <p:spTree>
@@ -5079,7 +5618,7 @@
 </p:sld>
 </file>
 
-<file path=ppt/slides/slide7.xml><?xml version="1.0" encoding="utf-8"?>
+<file path=ppt/slides/slide8.xml><?xml version="1.0" encoding="utf-8"?>
 <p:sld xmlns:a="http://schemas.openxmlformats.org/drawingml/2006/main" xmlns:r="http://schemas.openxmlformats.org/officeDocument/2006/relationships" xmlns:p="http://schemas.openxmlformats.org/presentationml/2006/main">
   <p:cSld>
     <p:spTree>
@@ -5118,7 +5657,11 @@
           <a:p>
             <a:r>
               <a:rPr lang="en-US" sz="3600" dirty="0" smtClean="0"/>
-              <a:t>Wait – let’s see that as </a:t>
+              <a:t>Wait – let’s see that </a:t>
+            </a:r>
+            <a:r>
+              <a:rPr lang="en-US" sz="3600" dirty="0" smtClean="0"/>
+              <a:t>in </a:t>
             </a:r>
             <a:r>
               <a:rPr lang="en-US" sz="3600" dirty="0" err="1" smtClean="0"/>

</xml_diff>

<commit_message>
Updated source link in presentation
</commit_message>
<xml_diff>
--- a/PowerPoint/GettingStartedWithNodejs.pptx
+++ b/PowerPoint/GettingStartedWithNodejs.pptx
@@ -667,7 +667,44 @@
           <a:bodyPr/>
           <a:lstStyle/>
           <a:p>
-            <a:endParaRPr lang="en-US" dirty="0"/>
+            <a:r>
+              <a:rPr lang="en-US" dirty="0" smtClean="0"/>
+              <a:t>Those worry</a:t>
+            </a:r>
+            <a:r>
+              <a:rPr lang="en-US" baseline="0" dirty="0" smtClean="0"/>
+              <a:t> moments are more about changing the way we think.  We’ve been taught programming through a synchronous lens.</a:t>
+            </a:r>
+          </a:p>
+          <a:p>
+            <a:pPr marL="0" marR="0" indent="0" algn="l" defTabSz="457200" rtl="0" eaLnBrk="1" fontAlgn="auto" latinLnBrk="0" hangingPunct="1">
+              <a:lnSpc>
+                <a:spcPct val="100000"/>
+              </a:lnSpc>
+              <a:spcBef>
+                <a:spcPts val="0"/>
+              </a:spcBef>
+              <a:spcAft>
+                <a:spcPts val="0"/>
+              </a:spcAft>
+              <a:buClrTx/>
+              <a:buSzTx/>
+              <a:buFontTx/>
+              <a:buNone/>
+              <a:tabLst/>
+              <a:defRPr/>
+            </a:pPr>
+            <a:r>
+              <a:rPr lang="en-US" sz="1200" kern="1200" dirty="0" smtClean="0">
+                <a:solidFill>
+                  <a:schemeClr val="tx1"/>
+                </a:solidFill>
+                <a:latin typeface="+mn-lt"/>
+                <a:ea typeface="+mn-ea"/>
+                <a:cs typeface="+mn-cs"/>
+              </a:rPr>
+              <a:t>"We're taught to demand input and do nothing until we have it” (Ryan)</a:t>
+            </a:r>
           </a:p>
         </p:txBody>
       </p:sp>
@@ -688,7 +725,7 @@
           <a:p>
             <a:fld id="{D633CFC9-9EA6-1241-A510-5FCAF76A6332}" type="slidenum">
               <a:rPr lang="en-US" smtClean="0"/>
-              <a:t>15</a:t>
+              <a:t>10</a:t>
             </a:fld>
             <a:endParaRPr lang="en-US"/>
           </a:p>
@@ -697,7 +734,7 @@
     </p:spTree>
     <p:extLst>
       <p:ext uri="{BB962C8B-B14F-4D97-AF65-F5344CB8AC3E}">
-        <p14:creationId xmlns:p14="http://schemas.microsoft.com/office/powerpoint/2010/main" val="1977194694"/>
+        <p14:creationId xmlns:p14="http://schemas.microsoft.com/office/powerpoint/2010/main" val="3320040173"/>
       </p:ext>
     </p:extLst>
   </p:cSld>
@@ -751,37 +788,7 @@
           <a:bodyPr/>
           <a:lstStyle/>
           <a:p>
-            <a:r>
-              <a:rPr lang="en-US" dirty="0" smtClean="0"/>
-              <a:t>Mention</a:t>
-            </a:r>
-            <a:r>
-              <a:rPr lang="en-US" baseline="0" dirty="0" smtClean="0"/>
-              <a:t> exports piece of modules</a:t>
-            </a:r>
-          </a:p>
-          <a:p>
-            <a:r>
-              <a:rPr lang="en-US" baseline="0" dirty="0" smtClean="0"/>
-              <a:t>1.5, </a:t>
-            </a:r>
-            <a:r>
-              <a:rPr lang="en-US" baseline="0" dirty="0" err="1" smtClean="0"/>
-              <a:t>etc</a:t>
-            </a:r>
-            <a:r>
-              <a:rPr lang="en-US" baseline="0" dirty="0" smtClean="0"/>
-              <a:t> specs give you map/filter/</a:t>
-            </a:r>
-            <a:r>
-              <a:rPr lang="en-US" baseline="0" dirty="0" err="1" smtClean="0"/>
-              <a:t>forEach</a:t>
-            </a:r>
-            <a:r>
-              <a:rPr lang="en-US" baseline="0" dirty="0" smtClean="0"/>
-              <a:t> and more….</a:t>
-            </a:r>
-            <a:endParaRPr lang="en-US" dirty="0"/>
+            <a:endParaRPr lang="en-US"/>
           </a:p>
         </p:txBody>
       </p:sp>
@@ -802,7 +809,7 @@
           <a:p>
             <a:fld id="{D633CFC9-9EA6-1241-A510-5FCAF76A6332}" type="slidenum">
               <a:rPr lang="en-US" smtClean="0"/>
-              <a:t>16</a:t>
+              <a:t>11</a:t>
             </a:fld>
             <a:endParaRPr lang="en-US"/>
           </a:p>
@@ -811,7 +818,7 @@
     </p:spTree>
     <p:extLst>
       <p:ext uri="{BB962C8B-B14F-4D97-AF65-F5344CB8AC3E}">
-        <p14:creationId xmlns:p14="http://schemas.microsoft.com/office/powerpoint/2010/main" val="2011859339"/>
+        <p14:creationId xmlns:p14="http://schemas.microsoft.com/office/powerpoint/2010/main" val="3823148551"/>
       </p:ext>
     </p:extLst>
   </p:cSld>
@@ -867,35 +874,33 @@
           <a:p>
             <a:r>
               <a:rPr lang="en-US" dirty="0" smtClean="0"/>
-              <a:t>Module imports</a:t>
-            </a:r>
-          </a:p>
-          <a:p>
-            <a:r>
-              <a:rPr lang="en-US" dirty="0" smtClean="0"/>
-              <a:t>Sockets array</a:t>
-            </a:r>
-          </a:p>
-          <a:p>
-            <a:r>
-              <a:rPr lang="en-US" dirty="0" smtClean="0"/>
-              <a:t>Web server, callback for a request</a:t>
-            </a:r>
-          </a:p>
-          <a:p>
-            <a:r>
-              <a:rPr lang="en-US" dirty="0" smtClean="0"/>
-              <a:t>Socket write call is</a:t>
+              <a:t>If an event loop behaves</a:t>
             </a:r>
             <a:r>
               <a:rPr lang="en-US" baseline="0" dirty="0" smtClean="0"/>
-              <a:t> non-blocking.  Entire array will be iterated and invoked before all writing is done</a:t>
+              <a:t> badly, it’s really a developer issue.</a:t>
             </a:r>
           </a:p>
           <a:p>
             <a:r>
               <a:rPr lang="en-US" baseline="0" dirty="0" smtClean="0"/>
-              <a:t>telnet server</a:t>
+              <a:t>Ex. – </a:t>
+            </a:r>
+            <a:r>
+              <a:rPr lang="en-US" baseline="0" dirty="0" err="1" smtClean="0"/>
+              <a:t>winforms</a:t>
+            </a:r>
+            <a:r>
+              <a:rPr lang="en-US" baseline="0" dirty="0" smtClean="0"/>
+              <a:t> or WPF UI w/long running operation….or web page with sync </a:t>
+            </a:r>
+            <a:r>
+              <a:rPr lang="en-US" baseline="0" dirty="0" err="1" smtClean="0"/>
+              <a:t>ajax</a:t>
+            </a:r>
+            <a:r>
+              <a:rPr lang="en-US" baseline="0" dirty="0" smtClean="0"/>
+              <a:t> call….</a:t>
             </a:r>
             <a:endParaRPr lang="en-US" dirty="0"/>
           </a:p>
@@ -918,7 +923,7 @@
           <a:p>
             <a:fld id="{D633CFC9-9EA6-1241-A510-5FCAF76A6332}" type="slidenum">
               <a:rPr lang="en-US" smtClean="0"/>
-              <a:t>17</a:t>
+              <a:t>12</a:t>
             </a:fld>
             <a:endParaRPr lang="en-US"/>
           </a:p>
@@ -927,7 +932,7 @@
     </p:spTree>
     <p:extLst>
       <p:ext uri="{BB962C8B-B14F-4D97-AF65-F5344CB8AC3E}">
-        <p14:creationId xmlns:p14="http://schemas.microsoft.com/office/powerpoint/2010/main" val="3863603642"/>
+        <p14:creationId xmlns:p14="http://schemas.microsoft.com/office/powerpoint/2010/main" val="2771658809"/>
       </p:ext>
     </p:extLst>
   </p:cSld>
@@ -983,33 +988,20 @@
           <a:p>
             <a:r>
               <a:rPr lang="en-US" dirty="0" smtClean="0"/>
-              <a:t>Building</a:t>
+              <a:t>Client</a:t>
             </a:r>
             <a:r>
               <a:rPr lang="en-US" baseline="0" dirty="0" smtClean="0"/>
-              <a:t> your own module isn’t terribly difficult.</a:t>
-            </a:r>
+              <a:t> A, the SYNCHRONOUS LOOP HOG</a:t>
+            </a:r>
+          </a:p>
+          <a:p>
+            <a:endParaRPr lang="en-US" baseline="0" dirty="0" smtClean="0"/>
           </a:p>
           <a:p>
             <a:r>
               <a:rPr lang="en-US" baseline="0" dirty="0" smtClean="0"/>
-              <a:t>You include a </a:t>
-            </a:r>
-            <a:r>
-              <a:rPr lang="en-US" baseline="0" dirty="0" err="1" smtClean="0"/>
-              <a:t>package.json</a:t>
-            </a:r>
-            <a:r>
-              <a:rPr lang="en-US" baseline="0" dirty="0" smtClean="0"/>
-              <a:t> file in </a:t>
-            </a:r>
-            <a:r>
-              <a:rPr lang="en-US" baseline="0" dirty="0" err="1" smtClean="0"/>
-              <a:t>dir</a:t>
-            </a:r>
-            <a:r>
-              <a:rPr lang="en-US" baseline="0" dirty="0" smtClean="0"/>
-              <a:t> root</a:t>
+              <a:t>So the deal is – you have to worry if you do something stupid…</a:t>
             </a:r>
             <a:endParaRPr lang="en-US" dirty="0"/>
           </a:p>
@@ -1032,7 +1024,7 @@
           <a:p>
             <a:fld id="{D633CFC9-9EA6-1241-A510-5FCAF76A6332}" type="slidenum">
               <a:rPr lang="en-US" smtClean="0"/>
-              <a:t>20</a:t>
+              <a:t>13</a:t>
             </a:fld>
             <a:endParaRPr lang="en-US"/>
           </a:p>
@@ -1041,7 +1033,7 @@
     </p:spTree>
     <p:extLst>
       <p:ext uri="{BB962C8B-B14F-4D97-AF65-F5344CB8AC3E}">
-        <p14:creationId xmlns:p14="http://schemas.microsoft.com/office/powerpoint/2010/main" val="1220171817"/>
+        <p14:creationId xmlns:p14="http://schemas.microsoft.com/office/powerpoint/2010/main" val="3252182806"/>
       </p:ext>
     </p:extLst>
   </p:cSld>
@@ -1097,7 +1089,11 @@
           <a:p>
             <a:r>
               <a:rPr lang="en-US" dirty="0" smtClean="0"/>
-              <a:t>Both seem great.  I use nave most since I found it first, but understand sub shell concerns other’s have</a:t>
+              <a:t>This is Node!</a:t>
+            </a:r>
+            <a:r>
+              <a:rPr lang="en-US" baseline="0" dirty="0" smtClean="0"/>
+              <a:t>  If you’re I/O bound, it’s the sweet spot.  It’s not where you need to be running intensive spatial calculations, crawling huge graphs, etc.</a:t>
             </a:r>
             <a:endParaRPr lang="en-US" dirty="0"/>
           </a:p>
@@ -1120,7 +1116,7 @@
           <a:p>
             <a:fld id="{D633CFC9-9EA6-1241-A510-5FCAF76A6332}" type="slidenum">
               <a:rPr lang="en-US" smtClean="0"/>
-              <a:t>21</a:t>
+              <a:t>14</a:t>
             </a:fld>
             <a:endParaRPr lang="en-US"/>
           </a:p>
@@ -1129,7 +1125,7 @@
     </p:spTree>
     <p:extLst>
       <p:ext uri="{BB962C8B-B14F-4D97-AF65-F5344CB8AC3E}">
-        <p14:creationId xmlns:p14="http://schemas.microsoft.com/office/powerpoint/2010/main" val="1220171817"/>
+        <p14:creationId xmlns:p14="http://schemas.microsoft.com/office/powerpoint/2010/main" val="3453378653"/>
       </p:ext>
     </p:extLst>
   </p:cSld>
@@ -1183,143 +1179,6 @@
           <a:bodyPr/>
           <a:lstStyle/>
           <a:p>
-            <a:r>
-              <a:rPr lang="en-US" dirty="0" smtClean="0"/>
-              <a:t>Command line debugger is NOT for the faint of heart, and it’s incomplete at the moment</a:t>
-            </a:r>
-          </a:p>
-          <a:p>
-            <a:r>
-              <a:rPr lang="en-US" dirty="0" smtClean="0"/>
-              <a:t>Node-inspector</a:t>
-            </a:r>
-            <a:r>
-              <a:rPr lang="en-US" baseline="0" dirty="0" smtClean="0"/>
-              <a:t> and Eclipse both connect to V-8 over port 5858 (unless you specify otherwise)</a:t>
-            </a:r>
-          </a:p>
-          <a:p>
-            <a:r>
-              <a:rPr lang="en-US" baseline="0" dirty="0" smtClean="0"/>
-              <a:t>I love that node-inspector is Chrome’s </a:t>
-            </a:r>
-            <a:r>
-              <a:rPr lang="en-US" baseline="0" dirty="0" err="1" smtClean="0"/>
-              <a:t>dev</a:t>
-            </a:r>
-            <a:r>
-              <a:rPr lang="en-US" baseline="0" dirty="0" smtClean="0"/>
-              <a:t> tools – it’s familiar…and heap snapshots!  (go require v8-profiler NOW)</a:t>
-            </a:r>
-          </a:p>
-          <a:p>
-            <a:r>
-              <a:rPr lang="en-US" baseline="0" dirty="0" smtClean="0"/>
-              <a:t>Eclipse is nice as well – feels less problematic due to the command line kung </a:t>
-            </a:r>
-            <a:r>
-              <a:rPr lang="en-US" baseline="0" dirty="0" err="1" smtClean="0"/>
-              <a:t>fu</a:t>
-            </a:r>
-            <a:r>
-              <a:rPr lang="en-US" baseline="0" dirty="0" smtClean="0"/>
-              <a:t> necessary for node-inspector</a:t>
-            </a:r>
-          </a:p>
-          <a:p>
-            <a:endParaRPr lang="en-US" baseline="0" dirty="0" smtClean="0"/>
-          </a:p>
-          <a:p>
-            <a:r>
-              <a:rPr lang="en-US" dirty="0" err="1" smtClean="0"/>
-              <a:t>var</a:t>
-            </a:r>
-            <a:r>
-              <a:rPr lang="en-US" dirty="0" smtClean="0"/>
-              <a:t> profiler = require('v8-profiler');</a:t>
-            </a:r>
-          </a:p>
-          <a:p>
-            <a:endParaRPr lang="en-US" dirty="0" smtClean="0"/>
-          </a:p>
-          <a:p>
-            <a:r>
-              <a:rPr lang="en-US" dirty="0" err="1" smtClean="0"/>
-              <a:t>profiler.startProfiling</a:t>
-            </a:r>
-            <a:r>
-              <a:rPr lang="en-US" dirty="0" smtClean="0"/>
-              <a:t>('startup');</a:t>
-            </a:r>
-          </a:p>
-          <a:p>
-            <a:r>
-              <a:rPr lang="en-US" dirty="0" err="1" smtClean="0"/>
-              <a:t>slowStartupFoo</a:t>
-            </a:r>
-            <a:r>
-              <a:rPr lang="en-US" dirty="0" smtClean="0"/>
-              <a:t>();</a:t>
-            </a:r>
-          </a:p>
-          <a:p>
-            <a:r>
-              <a:rPr lang="en-US" dirty="0" err="1" smtClean="0"/>
-              <a:t>profiler.stopProfiling</a:t>
-            </a:r>
-            <a:r>
-              <a:rPr lang="en-US" dirty="0" smtClean="0"/>
-              <a:t>('startup');</a:t>
-            </a:r>
-          </a:p>
-          <a:p>
-            <a:endParaRPr lang="en-US" dirty="0" smtClean="0"/>
-          </a:p>
-          <a:p>
-            <a:r>
-              <a:rPr lang="en-US" dirty="0" err="1" smtClean="0"/>
-              <a:t>profiler.takeSnapshot</a:t>
-            </a:r>
-            <a:r>
-              <a:rPr lang="en-US" dirty="0" smtClean="0"/>
-              <a:t>('</a:t>
-            </a:r>
-            <a:r>
-              <a:rPr lang="en-US" dirty="0" err="1" smtClean="0"/>
-              <a:t>beforeLeak</a:t>
-            </a:r>
-            <a:r>
-              <a:rPr lang="en-US" dirty="0" smtClean="0"/>
-              <a:t>');</a:t>
-            </a:r>
-          </a:p>
-          <a:p>
-            <a:r>
-              <a:rPr lang="en-US" dirty="0" err="1" smtClean="0"/>
-              <a:t>leakyFoo</a:t>
-            </a:r>
-            <a:r>
-              <a:rPr lang="en-US" dirty="0" smtClean="0"/>
-              <a:t>();</a:t>
-            </a:r>
-          </a:p>
-          <a:p>
-            <a:r>
-              <a:rPr lang="en-US" dirty="0" err="1" smtClean="0"/>
-              <a:t>profiler.takeSnapshot</a:t>
-            </a:r>
-            <a:r>
-              <a:rPr lang="en-US" dirty="0" smtClean="0"/>
-              <a:t>('</a:t>
-            </a:r>
-            <a:r>
-              <a:rPr lang="en-US" dirty="0" err="1" smtClean="0"/>
-              <a:t>afterLeak</a:t>
-            </a:r>
-            <a:r>
-              <a:rPr lang="en-US" dirty="0" smtClean="0"/>
-              <a:t>');</a:t>
-            </a:r>
             <a:endParaRPr lang="en-US" dirty="0"/>
           </a:p>
         </p:txBody>
@@ -1341,7 +1200,7 @@
           <a:p>
             <a:fld id="{D633CFC9-9EA6-1241-A510-5FCAF76A6332}" type="slidenum">
               <a:rPr lang="en-US" smtClean="0"/>
-              <a:t>22</a:t>
+              <a:t>15</a:t>
             </a:fld>
             <a:endParaRPr lang="en-US"/>
           </a:p>
@@ -1350,7 +1209,7 @@
     </p:spTree>
     <p:extLst>
       <p:ext uri="{BB962C8B-B14F-4D97-AF65-F5344CB8AC3E}">
-        <p14:creationId xmlns:p14="http://schemas.microsoft.com/office/powerpoint/2010/main" val="1220171817"/>
+        <p14:creationId xmlns:p14="http://schemas.microsoft.com/office/powerpoint/2010/main" val="1977194694"/>
       </p:ext>
     </p:extLst>
   </p:cSld>
@@ -1405,15 +1264,35 @@
           <a:lstStyle/>
           <a:p>
             <a:r>
-              <a:rPr lang="en-US" dirty="0" err="1" smtClean="0"/>
-              <a:t>Howtonode.org</a:t>
-            </a:r>
-            <a:r>
               <a:rPr lang="en-US" dirty="0" smtClean="0"/>
-              <a:t> implemented in wheat.</a:t>
-            </a:r>
-          </a:p>
-          <a:p>
+              <a:t>Mention</a:t>
+            </a:r>
+            <a:r>
+              <a:rPr lang="en-US" baseline="0" dirty="0" smtClean="0"/>
+              <a:t> exports piece of modules</a:t>
+            </a:r>
+          </a:p>
+          <a:p>
+            <a:r>
+              <a:rPr lang="en-US" baseline="0" dirty="0" smtClean="0"/>
+              <a:t>1.5, </a:t>
+            </a:r>
+            <a:r>
+              <a:rPr lang="en-US" baseline="0" dirty="0" err="1" smtClean="0"/>
+              <a:t>etc</a:t>
+            </a:r>
+            <a:r>
+              <a:rPr lang="en-US" baseline="0" dirty="0" smtClean="0"/>
+              <a:t> specs give you map/filter/</a:t>
+            </a:r>
+            <a:r>
+              <a:rPr lang="en-US" baseline="0" dirty="0" err="1" smtClean="0"/>
+              <a:t>forEach</a:t>
+            </a:r>
+            <a:r>
+              <a:rPr lang="en-US" baseline="0" dirty="0" smtClean="0"/>
+              <a:t> and more….</a:t>
+            </a:r>
             <a:endParaRPr lang="en-US" dirty="0"/>
           </a:p>
         </p:txBody>
@@ -1435,7 +1314,7 @@
           <a:p>
             <a:fld id="{D633CFC9-9EA6-1241-A510-5FCAF76A6332}" type="slidenum">
               <a:rPr lang="en-US" smtClean="0"/>
-              <a:t>23</a:t>
+              <a:t>16</a:t>
             </a:fld>
             <a:endParaRPr lang="en-US"/>
           </a:p>
@@ -1444,7 +1323,7 @@
     </p:spTree>
     <p:extLst>
       <p:ext uri="{BB962C8B-B14F-4D97-AF65-F5344CB8AC3E}">
-        <p14:creationId xmlns:p14="http://schemas.microsoft.com/office/powerpoint/2010/main" val="1613277740"/>
+        <p14:creationId xmlns:p14="http://schemas.microsoft.com/office/powerpoint/2010/main" val="2011859339"/>
       </p:ext>
     </p:extLst>
   </p:cSld>
@@ -1500,212 +1379,37 @@
           <a:p>
             <a:r>
               <a:rPr lang="en-US" dirty="0" smtClean="0"/>
-              <a:t>Twitter</a:t>
+              <a:t>Module imports</a:t>
+            </a:r>
+          </a:p>
+          <a:p>
+            <a:r>
+              <a:rPr lang="en-US" dirty="0" smtClean="0"/>
+              <a:t>Sockets array</a:t>
+            </a:r>
+          </a:p>
+          <a:p>
+            <a:r>
+              <a:rPr lang="en-US" dirty="0" smtClean="0"/>
+              <a:t>Web server, callback for a request</a:t>
+            </a:r>
+          </a:p>
+          <a:p>
+            <a:r>
+              <a:rPr lang="en-US" dirty="0" smtClean="0"/>
+              <a:t>Socket write call is</a:t>
             </a:r>
             <a:r>
               <a:rPr lang="en-US" baseline="0" dirty="0" smtClean="0"/>
-              <a:t> is using node to compile Less to CSS</a:t>
-            </a:r>
-          </a:p>
-          <a:p>
-            <a:pPr marL="0" marR="0" indent="0" algn="l" defTabSz="457200" rtl="0" eaLnBrk="1" fontAlgn="auto" latinLnBrk="0" hangingPunct="1">
-              <a:lnSpc>
-                <a:spcPct val="100000"/>
-              </a:lnSpc>
-              <a:spcBef>
-                <a:spcPts val="0"/>
-              </a:spcBef>
-              <a:spcAft>
-                <a:spcPts val="0"/>
-              </a:spcAft>
-              <a:buClrTx/>
-              <a:buSzTx/>
-              <a:buFontTx/>
-              <a:buNone/>
-              <a:tabLst/>
-              <a:defRPr/>
-            </a:pPr>
+              <a:t> non-blocking.  Entire array will be iterated and invoked before all writing is done</a:t>
+            </a:r>
+          </a:p>
+          <a:p>
             <a:r>
               <a:rPr lang="en-US" baseline="0" dirty="0" smtClean="0"/>
-              <a:t>Yahoo can’t say yet</a:t>
-            </a:r>
-          </a:p>
-          <a:p>
-            <a:pPr marL="0" marR="0" indent="0" algn="l" defTabSz="457200" rtl="0" eaLnBrk="1" fontAlgn="auto" latinLnBrk="0" hangingPunct="1">
-              <a:lnSpc>
-                <a:spcPct val="100000"/>
-              </a:lnSpc>
-              <a:spcBef>
-                <a:spcPts val="0"/>
-              </a:spcBef>
-              <a:spcAft>
-                <a:spcPts val="0"/>
-              </a:spcAft>
-              <a:buClrTx/>
-              <a:buSzTx/>
-              <a:buFontTx/>
-              <a:buNone/>
-              <a:tabLst/>
-              <a:defRPr/>
-            </a:pPr>
-            <a:r>
-              <a:rPr lang="en-US" baseline="0" dirty="0" err="1" smtClean="0"/>
-              <a:t>Bocoup</a:t>
-            </a:r>
-            <a:r>
-              <a:rPr lang="en-US" baseline="0" dirty="0" smtClean="0"/>
-              <a:t> built IRC bot for logging/stats</a:t>
-            </a:r>
-          </a:p>
-          <a:p>
-            <a:pPr marL="0" marR="0" indent="0" algn="l" defTabSz="457200" rtl="0" eaLnBrk="1" fontAlgn="auto" latinLnBrk="0" hangingPunct="1">
-              <a:lnSpc>
-                <a:spcPct val="100000"/>
-              </a:lnSpc>
-              <a:spcBef>
-                <a:spcPts val="0"/>
-              </a:spcBef>
-              <a:spcAft>
-                <a:spcPts val="0"/>
-              </a:spcAft>
-              <a:buClrTx/>
-              <a:buSzTx/>
-              <a:buFontTx/>
-              <a:buNone/>
-              <a:tabLst/>
-              <a:defRPr/>
-            </a:pPr>
-            <a:r>
-              <a:rPr lang="en-US" baseline="0" dirty="0" err="1" smtClean="0"/>
-              <a:t>Proxlet’s</a:t>
-            </a:r>
-            <a:r>
-              <a:rPr lang="en-US" baseline="0" dirty="0" smtClean="0"/>
-              <a:t> plugin uses node as the proxy</a:t>
-            </a:r>
-          </a:p>
-          <a:p>
-            <a:pPr marL="0" marR="0" indent="0" algn="l" defTabSz="457200" rtl="0" eaLnBrk="1" fontAlgn="auto" latinLnBrk="0" hangingPunct="1">
-              <a:lnSpc>
-                <a:spcPct val="100000"/>
-              </a:lnSpc>
-              <a:spcBef>
-                <a:spcPts val="0"/>
-              </a:spcBef>
-              <a:spcAft>
-                <a:spcPts val="0"/>
-              </a:spcAft>
-              <a:buClrTx/>
-              <a:buSzTx/>
-              <a:buFontTx/>
-              <a:buNone/>
-              <a:tabLst/>
-              <a:defRPr/>
-            </a:pPr>
-            <a:r>
-              <a:rPr lang="en-US" baseline="0" dirty="0" smtClean="0"/>
-              <a:t>Yammer uses node as a proxy for it’s API</a:t>
-            </a:r>
-          </a:p>
-          <a:p>
-            <a:pPr marL="0" marR="0" indent="0" algn="l" defTabSz="457200" rtl="0" eaLnBrk="1" fontAlgn="auto" latinLnBrk="0" hangingPunct="1">
-              <a:lnSpc>
-                <a:spcPct val="100000"/>
-              </a:lnSpc>
-              <a:spcBef>
-                <a:spcPts val="0"/>
-              </a:spcBef>
-              <a:spcAft>
-                <a:spcPts val="0"/>
-              </a:spcAft>
-              <a:buClrTx/>
-              <a:buSzTx/>
-              <a:buFontTx/>
-              <a:buNone/>
-              <a:tabLst/>
-              <a:defRPr/>
-            </a:pPr>
-            <a:r>
-              <a:rPr lang="en-US" baseline="0" dirty="0" smtClean="0"/>
-              <a:t>Worth mentioning that MS is working with </a:t>
-            </a:r>
-            <a:r>
-              <a:rPr lang="en-US" baseline="0" dirty="0" err="1" smtClean="0"/>
-              <a:t>Joyent</a:t>
-            </a:r>
-            <a:r>
-              <a:rPr lang="en-US" baseline="0" dirty="0" smtClean="0"/>
-              <a:t> on the win port of node/</a:t>
-            </a:r>
-            <a:r>
-              <a:rPr lang="en-US" baseline="0" dirty="0" err="1" smtClean="0"/>
-              <a:t>libuv</a:t>
-            </a:r>
-            <a:endParaRPr lang="en-US" baseline="0" dirty="0" smtClean="0"/>
-          </a:p>
-          <a:p>
-            <a:pPr marL="0" marR="0" indent="0" algn="l" defTabSz="457200" rtl="0" eaLnBrk="1" fontAlgn="auto" latinLnBrk="0" hangingPunct="1">
-              <a:lnSpc>
-                <a:spcPct val="100000"/>
-              </a:lnSpc>
-              <a:spcBef>
-                <a:spcPts val="0"/>
-              </a:spcBef>
-              <a:spcAft>
-                <a:spcPts val="0"/>
-              </a:spcAft>
-              <a:buClrTx/>
-              <a:buSzTx/>
-              <a:buFontTx/>
-              <a:buNone/>
-              <a:tabLst/>
-              <a:defRPr/>
-            </a:pPr>
-            <a:r>
-              <a:rPr lang="en-US" baseline="0" dirty="0" smtClean="0"/>
-              <a:t>LinkedIn uses node for the mobile server side stack</a:t>
-            </a:r>
-            <a:endParaRPr lang="en-US" baseline="0" dirty="0" smtClean="0"/>
-          </a:p>
-          <a:p>
-            <a:pPr marL="0" marR="0" indent="0" algn="l" defTabSz="457200" rtl="0" eaLnBrk="1" fontAlgn="auto" latinLnBrk="0" hangingPunct="1">
-              <a:lnSpc>
-                <a:spcPct val="100000"/>
-              </a:lnSpc>
-              <a:spcBef>
-                <a:spcPts val="0"/>
-              </a:spcBef>
-              <a:spcAft>
-                <a:spcPts val="0"/>
-              </a:spcAft>
-              <a:buClrTx/>
-              <a:buSzTx/>
-              <a:buFontTx/>
-              <a:buNone/>
-              <a:tabLst/>
-              <a:defRPr/>
-            </a:pPr>
-            <a:endParaRPr lang="en-US" baseline="0" dirty="0" smtClean="0"/>
-          </a:p>
-          <a:p>
-            <a:pPr marL="0" marR="0" indent="0" algn="l" defTabSz="457200" rtl="0" eaLnBrk="1" fontAlgn="auto" latinLnBrk="0" hangingPunct="1">
-              <a:lnSpc>
-                <a:spcPct val="100000"/>
-              </a:lnSpc>
-              <a:spcBef>
-                <a:spcPts val="0"/>
-              </a:spcBef>
-              <a:spcAft>
-                <a:spcPts val="0"/>
-              </a:spcAft>
-              <a:buClrTx/>
-              <a:buSzTx/>
-              <a:buFontTx/>
-              <a:buNone/>
-              <a:tabLst/>
-              <a:defRPr/>
-            </a:pPr>
-            <a:endParaRPr lang="en-US" baseline="0" dirty="0" smtClean="0"/>
+              <a:t>telnet server</a:t>
+            </a:r>
+            <a:endParaRPr lang="en-US" dirty="0"/>
           </a:p>
         </p:txBody>
       </p:sp>
@@ -1726,7 +1430,7 @@
           <a:p>
             <a:fld id="{D633CFC9-9EA6-1241-A510-5FCAF76A6332}" type="slidenum">
               <a:rPr lang="en-US" smtClean="0"/>
-              <a:t>24</a:t>
+              <a:t>17</a:t>
             </a:fld>
             <a:endParaRPr lang="en-US"/>
           </a:p>
@@ -1735,7 +1439,7 @@
     </p:spTree>
     <p:extLst>
       <p:ext uri="{BB962C8B-B14F-4D97-AF65-F5344CB8AC3E}">
-        <p14:creationId xmlns:p14="http://schemas.microsoft.com/office/powerpoint/2010/main" val="1890685000"/>
+        <p14:creationId xmlns:p14="http://schemas.microsoft.com/office/powerpoint/2010/main" val="3863603642"/>
       </p:ext>
     </p:extLst>
   </p:cSld>
@@ -1789,21 +1493,7 @@
           <a:bodyPr/>
           <a:lstStyle/>
           <a:p>
-            <a:r>
-              <a:rPr lang="en-US" dirty="0" smtClean="0"/>
-              <a:t>READ CODE READ CODE READ CODE</a:t>
-            </a:r>
-          </a:p>
-          <a:p>
-            <a:r>
-              <a:rPr lang="en-US" dirty="0" smtClean="0"/>
-              <a:t>Tim</a:t>
-            </a:r>
-            <a:r>
-              <a:rPr lang="en-US" baseline="0" dirty="0" smtClean="0"/>
-              <a:t> Caswell will melt your brain in a good way</a:t>
-            </a:r>
-            <a:endParaRPr lang="en-US" dirty="0"/>
+            <a:endParaRPr lang="en-US"/>
           </a:p>
         </p:txBody>
       </p:sp>
@@ -1824,7 +1514,7 @@
           <a:p>
             <a:fld id="{D633CFC9-9EA6-1241-A510-5FCAF76A6332}" type="slidenum">
               <a:rPr lang="en-US" smtClean="0"/>
-              <a:t>25</a:t>
+              <a:t>18</a:t>
             </a:fld>
             <a:endParaRPr lang="en-US"/>
           </a:p>
@@ -1833,7 +1523,91 @@
     </p:spTree>
     <p:extLst>
       <p:ext uri="{BB962C8B-B14F-4D97-AF65-F5344CB8AC3E}">
-        <p14:creationId xmlns:p14="http://schemas.microsoft.com/office/powerpoint/2010/main" val="30431674"/>
+        <p14:creationId xmlns:p14="http://schemas.microsoft.com/office/powerpoint/2010/main" val="4160998140"/>
+      </p:ext>
+    </p:extLst>
+  </p:cSld>
+  <p:clrMapOvr>
+    <a:masterClrMapping/>
+  </p:clrMapOvr>
+</p:notes>
+</file>
+
+<file path=ppt/notesSlides/notesSlide19.xml><?xml version="1.0" encoding="utf-8"?>
+<p:notes xmlns:a="http://schemas.openxmlformats.org/drawingml/2006/main" xmlns:r="http://schemas.openxmlformats.org/officeDocument/2006/relationships" xmlns:p="http://schemas.openxmlformats.org/presentationml/2006/main">
+  <p:cSld>
+    <p:spTree>
+      <p:nvGrpSpPr>
+        <p:cNvPr id="1" name=""/>
+        <p:cNvGrpSpPr/>
+        <p:nvPr/>
+      </p:nvGrpSpPr>
+      <p:grpSpPr>
+        <a:xfrm>
+          <a:off x="0" y="0"/>
+          <a:ext cx="0" cy="0"/>
+          <a:chOff x="0" y="0"/>
+          <a:chExt cx="0" cy="0"/>
+        </a:xfrm>
+      </p:grpSpPr>
+      <p:sp>
+        <p:nvSpPr>
+          <p:cNvPr id="2" name="Slide Image Placeholder 1"/>
+          <p:cNvSpPr>
+            <a:spLocks noGrp="1" noRot="1" noChangeAspect="1"/>
+          </p:cNvSpPr>
+          <p:nvPr>
+            <p:ph type="sldImg"/>
+          </p:nvPr>
+        </p:nvSpPr>
+        <p:spPr/>
+      </p:sp>
+      <p:sp>
+        <p:nvSpPr>
+          <p:cNvPr id="3" name="Notes Placeholder 2"/>
+          <p:cNvSpPr>
+            <a:spLocks noGrp="1"/>
+          </p:cNvSpPr>
+          <p:nvPr>
+            <p:ph type="body" idx="1"/>
+          </p:nvPr>
+        </p:nvSpPr>
+        <p:spPr/>
+        <p:txBody>
+          <a:bodyPr/>
+          <a:lstStyle/>
+          <a:p>
+            <a:endParaRPr lang="en-US"/>
+          </a:p>
+        </p:txBody>
+      </p:sp>
+      <p:sp>
+        <p:nvSpPr>
+          <p:cNvPr id="4" name="Slide Number Placeholder 3"/>
+          <p:cNvSpPr>
+            <a:spLocks noGrp="1"/>
+          </p:cNvSpPr>
+          <p:nvPr>
+            <p:ph type="sldNum" sz="quarter" idx="10"/>
+          </p:nvPr>
+        </p:nvSpPr>
+        <p:spPr/>
+        <p:txBody>
+          <a:bodyPr/>
+          <a:lstStyle/>
+          <a:p>
+            <a:fld id="{D633CFC9-9EA6-1241-A510-5FCAF76A6332}" type="slidenum">
+              <a:rPr lang="en-US" smtClean="0"/>
+              <a:t>19</a:t>
+            </a:fld>
+            <a:endParaRPr lang="en-US"/>
+          </a:p>
+        </p:txBody>
+      </p:sp>
+    </p:spTree>
+    <p:extLst>
+      <p:ext uri="{BB962C8B-B14F-4D97-AF65-F5344CB8AC3E}">
+        <p14:creationId xmlns:p14="http://schemas.microsoft.com/office/powerpoint/2010/main" val="3671975914"/>
       </p:ext>
     </p:extLst>
   </p:cSld>
@@ -1887,64 +1661,7 @@
           <a:bodyPr/>
           <a:lstStyle/>
           <a:p>
-            <a:r>
-              <a:rPr lang="en-US" sz="1200" kern="1200" dirty="0" smtClean="0">
-                <a:solidFill>
-                  <a:schemeClr val="tx1"/>
-                </a:solidFill>
-                <a:latin typeface="+mn-lt"/>
-                <a:ea typeface="+mn-ea"/>
-                <a:cs typeface="+mn-cs"/>
-              </a:rPr>
-              <a:t>"We're taught to demand input and do nothing until we have it” (Ryan)</a:t>
-            </a:r>
-          </a:p>
-          <a:p>
-            <a:r>
-              <a:rPr lang="en-US" sz="1200" kern="1200" dirty="0" smtClean="0">
-                <a:solidFill>
-                  <a:schemeClr val="tx1"/>
-                </a:solidFill>
-                <a:latin typeface="+mn-lt"/>
-                <a:ea typeface="+mn-ea"/>
-                <a:cs typeface="+mn-cs"/>
-              </a:rPr>
-              <a:t>“I’m not afraid</a:t>
-            </a:r>
-            <a:r>
-              <a:rPr lang="en-US" sz="1200" kern="1200" baseline="0" dirty="0" smtClean="0">
-                <a:solidFill>
-                  <a:schemeClr val="tx1"/>
-                </a:solidFill>
-                <a:latin typeface="+mn-lt"/>
-                <a:ea typeface="+mn-ea"/>
-                <a:cs typeface="+mn-cs"/>
-              </a:rPr>
-              <a:t> of threads”…since when is debugging thread bugs easy?</a:t>
-            </a:r>
-          </a:p>
-          <a:p>
-            <a:r>
-              <a:rPr lang="en-US" sz="1200" kern="1200" baseline="0" dirty="0" smtClean="0">
-                <a:solidFill>
-                  <a:schemeClr val="tx1"/>
-                </a:solidFill>
-                <a:latin typeface="+mn-lt"/>
-                <a:ea typeface="+mn-ea"/>
-                <a:cs typeface="+mn-cs"/>
-              </a:rPr>
-              <a:t>KNOW when your code is going to yield</a:t>
-            </a:r>
-          </a:p>
-          <a:p>
-            <a:endParaRPr lang="en-US" sz="1200" kern="1200" baseline="0" dirty="0" smtClean="0">
-              <a:solidFill>
-                <a:schemeClr val="tx1"/>
-              </a:solidFill>
-              <a:latin typeface="+mn-lt"/>
-              <a:ea typeface="+mn-ea"/>
-              <a:cs typeface="+mn-cs"/>
-            </a:endParaRPr>
+            <a:endParaRPr lang="en-US"/>
           </a:p>
         </p:txBody>
       </p:sp>
@@ -1965,7 +1682,121 @@
           <a:p>
             <a:fld id="{D633CFC9-9EA6-1241-A510-5FCAF76A6332}" type="slidenum">
               <a:rPr lang="en-US" smtClean="0"/>
-              <a:t>3</a:t>
+              <a:t>2</a:t>
+            </a:fld>
+            <a:endParaRPr lang="en-US"/>
+          </a:p>
+        </p:txBody>
+      </p:sp>
+    </p:spTree>
+    <p:extLst>
+      <p:ext uri="{BB962C8B-B14F-4D97-AF65-F5344CB8AC3E}">
+        <p14:creationId xmlns:p14="http://schemas.microsoft.com/office/powerpoint/2010/main" val="2642058417"/>
+      </p:ext>
+    </p:extLst>
+  </p:cSld>
+  <p:clrMapOvr>
+    <a:masterClrMapping/>
+  </p:clrMapOvr>
+</p:notes>
+</file>
+
+<file path=ppt/notesSlides/notesSlide20.xml><?xml version="1.0" encoding="utf-8"?>
+<p:notes xmlns:a="http://schemas.openxmlformats.org/drawingml/2006/main" xmlns:r="http://schemas.openxmlformats.org/officeDocument/2006/relationships" xmlns:p="http://schemas.openxmlformats.org/presentationml/2006/main">
+  <p:cSld>
+    <p:spTree>
+      <p:nvGrpSpPr>
+        <p:cNvPr id="1" name=""/>
+        <p:cNvGrpSpPr/>
+        <p:nvPr/>
+      </p:nvGrpSpPr>
+      <p:grpSpPr>
+        <a:xfrm>
+          <a:off x="0" y="0"/>
+          <a:ext cx="0" cy="0"/>
+          <a:chOff x="0" y="0"/>
+          <a:chExt cx="0" cy="0"/>
+        </a:xfrm>
+      </p:grpSpPr>
+      <p:sp>
+        <p:nvSpPr>
+          <p:cNvPr id="2" name="Slide Image Placeholder 1"/>
+          <p:cNvSpPr>
+            <a:spLocks noGrp="1" noRot="1" noChangeAspect="1"/>
+          </p:cNvSpPr>
+          <p:nvPr>
+            <p:ph type="sldImg"/>
+          </p:nvPr>
+        </p:nvSpPr>
+        <p:spPr/>
+      </p:sp>
+      <p:sp>
+        <p:nvSpPr>
+          <p:cNvPr id="3" name="Notes Placeholder 2"/>
+          <p:cNvSpPr>
+            <a:spLocks noGrp="1"/>
+          </p:cNvSpPr>
+          <p:nvPr>
+            <p:ph type="body" idx="1"/>
+          </p:nvPr>
+        </p:nvSpPr>
+        <p:spPr/>
+        <p:txBody>
+          <a:bodyPr/>
+          <a:lstStyle/>
+          <a:p>
+            <a:r>
+              <a:rPr lang="en-US" dirty="0" smtClean="0"/>
+              <a:t>Building</a:t>
+            </a:r>
+            <a:r>
+              <a:rPr lang="en-US" baseline="0" dirty="0" smtClean="0"/>
+              <a:t> your own module isn’t terribly difficult.</a:t>
+            </a:r>
+          </a:p>
+          <a:p>
+            <a:r>
+              <a:rPr lang="en-US" baseline="0" dirty="0" smtClean="0"/>
+              <a:t>You include a </a:t>
+            </a:r>
+            <a:r>
+              <a:rPr lang="en-US" baseline="0" dirty="0" err="1" smtClean="0"/>
+              <a:t>package.json</a:t>
+            </a:r>
+            <a:r>
+              <a:rPr lang="en-US" baseline="0" dirty="0" smtClean="0"/>
+              <a:t> file in </a:t>
+            </a:r>
+            <a:r>
+              <a:rPr lang="en-US" baseline="0" dirty="0" err="1" smtClean="0"/>
+              <a:t>dir</a:t>
+            </a:r>
+            <a:r>
+              <a:rPr lang="en-US" baseline="0" dirty="0" smtClean="0"/>
+              <a:t> root</a:t>
+            </a:r>
+            <a:endParaRPr lang="en-US" dirty="0"/>
+          </a:p>
+        </p:txBody>
+      </p:sp>
+      <p:sp>
+        <p:nvSpPr>
+          <p:cNvPr id="4" name="Slide Number Placeholder 3"/>
+          <p:cNvSpPr>
+            <a:spLocks noGrp="1"/>
+          </p:cNvSpPr>
+          <p:nvPr>
+            <p:ph type="sldNum" sz="quarter" idx="10"/>
+          </p:nvPr>
+        </p:nvSpPr>
+        <p:spPr/>
+        <p:txBody>
+          <a:bodyPr/>
+          <a:lstStyle/>
+          <a:p>
+            <a:fld id="{D633CFC9-9EA6-1241-A510-5FCAF76A6332}" type="slidenum">
+              <a:rPr lang="en-US" smtClean="0"/>
+              <a:t>20</a:t>
             </a:fld>
             <a:endParaRPr lang="en-US"/>
           </a:p>
@@ -1975,6 +1806,881 @@
     <p:extLst>
       <p:ext uri="{BB962C8B-B14F-4D97-AF65-F5344CB8AC3E}">
         <p14:creationId xmlns:p14="http://schemas.microsoft.com/office/powerpoint/2010/main" val="1220171817"/>
+      </p:ext>
+    </p:extLst>
+  </p:cSld>
+  <p:clrMapOvr>
+    <a:masterClrMapping/>
+  </p:clrMapOvr>
+</p:notes>
+</file>
+
+<file path=ppt/notesSlides/notesSlide21.xml><?xml version="1.0" encoding="utf-8"?>
+<p:notes xmlns:a="http://schemas.openxmlformats.org/drawingml/2006/main" xmlns:r="http://schemas.openxmlformats.org/officeDocument/2006/relationships" xmlns:p="http://schemas.openxmlformats.org/presentationml/2006/main">
+  <p:cSld>
+    <p:spTree>
+      <p:nvGrpSpPr>
+        <p:cNvPr id="1" name=""/>
+        <p:cNvGrpSpPr/>
+        <p:nvPr/>
+      </p:nvGrpSpPr>
+      <p:grpSpPr>
+        <a:xfrm>
+          <a:off x="0" y="0"/>
+          <a:ext cx="0" cy="0"/>
+          <a:chOff x="0" y="0"/>
+          <a:chExt cx="0" cy="0"/>
+        </a:xfrm>
+      </p:grpSpPr>
+      <p:sp>
+        <p:nvSpPr>
+          <p:cNvPr id="2" name="Slide Image Placeholder 1"/>
+          <p:cNvSpPr>
+            <a:spLocks noGrp="1" noRot="1" noChangeAspect="1"/>
+          </p:cNvSpPr>
+          <p:nvPr>
+            <p:ph type="sldImg"/>
+          </p:nvPr>
+        </p:nvSpPr>
+        <p:spPr/>
+      </p:sp>
+      <p:sp>
+        <p:nvSpPr>
+          <p:cNvPr id="3" name="Notes Placeholder 2"/>
+          <p:cNvSpPr>
+            <a:spLocks noGrp="1"/>
+          </p:cNvSpPr>
+          <p:nvPr>
+            <p:ph type="body" idx="1"/>
+          </p:nvPr>
+        </p:nvSpPr>
+        <p:spPr/>
+        <p:txBody>
+          <a:bodyPr/>
+          <a:lstStyle/>
+          <a:p>
+            <a:r>
+              <a:rPr lang="en-US" dirty="0" smtClean="0"/>
+              <a:t>Both seem great.  I use nave most since I found it first, but understand sub shell concerns other’s have</a:t>
+            </a:r>
+            <a:endParaRPr lang="en-US" dirty="0"/>
+          </a:p>
+        </p:txBody>
+      </p:sp>
+      <p:sp>
+        <p:nvSpPr>
+          <p:cNvPr id="4" name="Slide Number Placeholder 3"/>
+          <p:cNvSpPr>
+            <a:spLocks noGrp="1"/>
+          </p:cNvSpPr>
+          <p:nvPr>
+            <p:ph type="sldNum" sz="quarter" idx="10"/>
+          </p:nvPr>
+        </p:nvSpPr>
+        <p:spPr/>
+        <p:txBody>
+          <a:bodyPr/>
+          <a:lstStyle/>
+          <a:p>
+            <a:fld id="{D633CFC9-9EA6-1241-A510-5FCAF76A6332}" type="slidenum">
+              <a:rPr lang="en-US" smtClean="0"/>
+              <a:t>21</a:t>
+            </a:fld>
+            <a:endParaRPr lang="en-US"/>
+          </a:p>
+        </p:txBody>
+      </p:sp>
+    </p:spTree>
+    <p:extLst>
+      <p:ext uri="{BB962C8B-B14F-4D97-AF65-F5344CB8AC3E}">
+        <p14:creationId xmlns:p14="http://schemas.microsoft.com/office/powerpoint/2010/main" val="1220171817"/>
+      </p:ext>
+    </p:extLst>
+  </p:cSld>
+  <p:clrMapOvr>
+    <a:masterClrMapping/>
+  </p:clrMapOvr>
+</p:notes>
+</file>
+
+<file path=ppt/notesSlides/notesSlide22.xml><?xml version="1.0" encoding="utf-8"?>
+<p:notes xmlns:a="http://schemas.openxmlformats.org/drawingml/2006/main" xmlns:r="http://schemas.openxmlformats.org/officeDocument/2006/relationships" xmlns:p="http://schemas.openxmlformats.org/presentationml/2006/main">
+  <p:cSld>
+    <p:spTree>
+      <p:nvGrpSpPr>
+        <p:cNvPr id="1" name=""/>
+        <p:cNvGrpSpPr/>
+        <p:nvPr/>
+      </p:nvGrpSpPr>
+      <p:grpSpPr>
+        <a:xfrm>
+          <a:off x="0" y="0"/>
+          <a:ext cx="0" cy="0"/>
+          <a:chOff x="0" y="0"/>
+          <a:chExt cx="0" cy="0"/>
+        </a:xfrm>
+      </p:grpSpPr>
+      <p:sp>
+        <p:nvSpPr>
+          <p:cNvPr id="2" name="Slide Image Placeholder 1"/>
+          <p:cNvSpPr>
+            <a:spLocks noGrp="1" noRot="1" noChangeAspect="1"/>
+          </p:cNvSpPr>
+          <p:nvPr>
+            <p:ph type="sldImg"/>
+          </p:nvPr>
+        </p:nvSpPr>
+        <p:spPr/>
+      </p:sp>
+      <p:sp>
+        <p:nvSpPr>
+          <p:cNvPr id="3" name="Notes Placeholder 2"/>
+          <p:cNvSpPr>
+            <a:spLocks noGrp="1"/>
+          </p:cNvSpPr>
+          <p:nvPr>
+            <p:ph type="body" idx="1"/>
+          </p:nvPr>
+        </p:nvSpPr>
+        <p:spPr/>
+        <p:txBody>
+          <a:bodyPr/>
+          <a:lstStyle/>
+          <a:p>
+            <a:r>
+              <a:rPr lang="en-US" dirty="0" smtClean="0"/>
+              <a:t>Command line debugger is NOT for the faint of heart, and it’s incomplete at the moment</a:t>
+            </a:r>
+          </a:p>
+          <a:p>
+            <a:r>
+              <a:rPr lang="en-US" dirty="0" smtClean="0"/>
+              <a:t>Node-inspector</a:t>
+            </a:r>
+            <a:r>
+              <a:rPr lang="en-US" baseline="0" dirty="0" smtClean="0"/>
+              <a:t> and Eclipse both connect to V-8 over port 5858 (unless you specify otherwise)</a:t>
+            </a:r>
+          </a:p>
+          <a:p>
+            <a:r>
+              <a:rPr lang="en-US" baseline="0" dirty="0" smtClean="0"/>
+              <a:t>I love that node-inspector is Chrome’s </a:t>
+            </a:r>
+            <a:r>
+              <a:rPr lang="en-US" baseline="0" dirty="0" err="1" smtClean="0"/>
+              <a:t>dev</a:t>
+            </a:r>
+            <a:r>
+              <a:rPr lang="en-US" baseline="0" dirty="0" smtClean="0"/>
+              <a:t> tools – it’s familiar…and heap snapshots!  (go require v8-profiler NOW)</a:t>
+            </a:r>
+          </a:p>
+          <a:p>
+            <a:r>
+              <a:rPr lang="en-US" baseline="0" dirty="0" smtClean="0"/>
+              <a:t>Eclipse is nice as well – feels less problematic due to the command line kung </a:t>
+            </a:r>
+            <a:r>
+              <a:rPr lang="en-US" baseline="0" dirty="0" err="1" smtClean="0"/>
+              <a:t>fu</a:t>
+            </a:r>
+            <a:r>
+              <a:rPr lang="en-US" baseline="0" dirty="0" smtClean="0"/>
+              <a:t> necessary for node-inspector</a:t>
+            </a:r>
+          </a:p>
+          <a:p>
+            <a:endParaRPr lang="en-US" baseline="0" dirty="0" smtClean="0"/>
+          </a:p>
+          <a:p>
+            <a:r>
+              <a:rPr lang="en-US" dirty="0" err="1" smtClean="0"/>
+              <a:t>var</a:t>
+            </a:r>
+            <a:r>
+              <a:rPr lang="en-US" dirty="0" smtClean="0"/>
+              <a:t> profiler = require('v8-profiler');</a:t>
+            </a:r>
+          </a:p>
+          <a:p>
+            <a:endParaRPr lang="en-US" dirty="0" smtClean="0"/>
+          </a:p>
+          <a:p>
+            <a:r>
+              <a:rPr lang="en-US" dirty="0" err="1" smtClean="0"/>
+              <a:t>profiler.startProfiling</a:t>
+            </a:r>
+            <a:r>
+              <a:rPr lang="en-US" dirty="0" smtClean="0"/>
+              <a:t>('startup');</a:t>
+            </a:r>
+          </a:p>
+          <a:p>
+            <a:r>
+              <a:rPr lang="en-US" dirty="0" err="1" smtClean="0"/>
+              <a:t>slowStartupFoo</a:t>
+            </a:r>
+            <a:r>
+              <a:rPr lang="en-US" dirty="0" smtClean="0"/>
+              <a:t>();</a:t>
+            </a:r>
+          </a:p>
+          <a:p>
+            <a:r>
+              <a:rPr lang="en-US" dirty="0" err="1" smtClean="0"/>
+              <a:t>profiler.stopProfiling</a:t>
+            </a:r>
+            <a:r>
+              <a:rPr lang="en-US" dirty="0" smtClean="0"/>
+              <a:t>('startup');</a:t>
+            </a:r>
+          </a:p>
+          <a:p>
+            <a:endParaRPr lang="en-US" dirty="0" smtClean="0"/>
+          </a:p>
+          <a:p>
+            <a:r>
+              <a:rPr lang="en-US" dirty="0" err="1" smtClean="0"/>
+              <a:t>profiler.takeSnapshot</a:t>
+            </a:r>
+            <a:r>
+              <a:rPr lang="en-US" dirty="0" smtClean="0"/>
+              <a:t>('</a:t>
+            </a:r>
+            <a:r>
+              <a:rPr lang="en-US" dirty="0" err="1" smtClean="0"/>
+              <a:t>beforeLeak</a:t>
+            </a:r>
+            <a:r>
+              <a:rPr lang="en-US" dirty="0" smtClean="0"/>
+              <a:t>');</a:t>
+            </a:r>
+          </a:p>
+          <a:p>
+            <a:r>
+              <a:rPr lang="en-US" dirty="0" err="1" smtClean="0"/>
+              <a:t>leakyFoo</a:t>
+            </a:r>
+            <a:r>
+              <a:rPr lang="en-US" dirty="0" smtClean="0"/>
+              <a:t>();</a:t>
+            </a:r>
+          </a:p>
+          <a:p>
+            <a:r>
+              <a:rPr lang="en-US" dirty="0" err="1" smtClean="0"/>
+              <a:t>profiler.takeSnapshot</a:t>
+            </a:r>
+            <a:r>
+              <a:rPr lang="en-US" dirty="0" smtClean="0"/>
+              <a:t>('</a:t>
+            </a:r>
+            <a:r>
+              <a:rPr lang="en-US" dirty="0" err="1" smtClean="0"/>
+              <a:t>afterLeak</a:t>
+            </a:r>
+            <a:r>
+              <a:rPr lang="en-US" dirty="0" smtClean="0"/>
+              <a:t>');</a:t>
+            </a:r>
+            <a:endParaRPr lang="en-US" dirty="0"/>
+          </a:p>
+        </p:txBody>
+      </p:sp>
+      <p:sp>
+        <p:nvSpPr>
+          <p:cNvPr id="4" name="Slide Number Placeholder 3"/>
+          <p:cNvSpPr>
+            <a:spLocks noGrp="1"/>
+          </p:cNvSpPr>
+          <p:nvPr>
+            <p:ph type="sldNum" sz="quarter" idx="10"/>
+          </p:nvPr>
+        </p:nvSpPr>
+        <p:spPr/>
+        <p:txBody>
+          <a:bodyPr/>
+          <a:lstStyle/>
+          <a:p>
+            <a:fld id="{D633CFC9-9EA6-1241-A510-5FCAF76A6332}" type="slidenum">
+              <a:rPr lang="en-US" smtClean="0"/>
+              <a:t>22</a:t>
+            </a:fld>
+            <a:endParaRPr lang="en-US"/>
+          </a:p>
+        </p:txBody>
+      </p:sp>
+    </p:spTree>
+    <p:extLst>
+      <p:ext uri="{BB962C8B-B14F-4D97-AF65-F5344CB8AC3E}">
+        <p14:creationId xmlns:p14="http://schemas.microsoft.com/office/powerpoint/2010/main" val="1220171817"/>
+      </p:ext>
+    </p:extLst>
+  </p:cSld>
+  <p:clrMapOvr>
+    <a:masterClrMapping/>
+  </p:clrMapOvr>
+</p:notes>
+</file>
+
+<file path=ppt/notesSlides/notesSlide23.xml><?xml version="1.0" encoding="utf-8"?>
+<p:notes xmlns:a="http://schemas.openxmlformats.org/drawingml/2006/main" xmlns:r="http://schemas.openxmlformats.org/officeDocument/2006/relationships" xmlns:p="http://schemas.openxmlformats.org/presentationml/2006/main">
+  <p:cSld>
+    <p:spTree>
+      <p:nvGrpSpPr>
+        <p:cNvPr id="1" name=""/>
+        <p:cNvGrpSpPr/>
+        <p:nvPr/>
+      </p:nvGrpSpPr>
+      <p:grpSpPr>
+        <a:xfrm>
+          <a:off x="0" y="0"/>
+          <a:ext cx="0" cy="0"/>
+          <a:chOff x="0" y="0"/>
+          <a:chExt cx="0" cy="0"/>
+        </a:xfrm>
+      </p:grpSpPr>
+      <p:sp>
+        <p:nvSpPr>
+          <p:cNvPr id="2" name="Slide Image Placeholder 1"/>
+          <p:cNvSpPr>
+            <a:spLocks noGrp="1" noRot="1" noChangeAspect="1"/>
+          </p:cNvSpPr>
+          <p:nvPr>
+            <p:ph type="sldImg"/>
+          </p:nvPr>
+        </p:nvSpPr>
+        <p:spPr/>
+      </p:sp>
+      <p:sp>
+        <p:nvSpPr>
+          <p:cNvPr id="3" name="Notes Placeholder 2"/>
+          <p:cNvSpPr>
+            <a:spLocks noGrp="1"/>
+          </p:cNvSpPr>
+          <p:nvPr>
+            <p:ph type="body" idx="1"/>
+          </p:nvPr>
+        </p:nvSpPr>
+        <p:spPr/>
+        <p:txBody>
+          <a:bodyPr/>
+          <a:lstStyle/>
+          <a:p>
+            <a:r>
+              <a:rPr lang="en-US" dirty="0" err="1" smtClean="0"/>
+              <a:t>Howtonode.org</a:t>
+            </a:r>
+            <a:r>
+              <a:rPr lang="en-US" dirty="0" smtClean="0"/>
+              <a:t> implemented in wheat.</a:t>
+            </a:r>
+          </a:p>
+          <a:p>
+            <a:endParaRPr lang="en-US" dirty="0"/>
+          </a:p>
+        </p:txBody>
+      </p:sp>
+      <p:sp>
+        <p:nvSpPr>
+          <p:cNvPr id="4" name="Slide Number Placeholder 3"/>
+          <p:cNvSpPr>
+            <a:spLocks noGrp="1"/>
+          </p:cNvSpPr>
+          <p:nvPr>
+            <p:ph type="sldNum" sz="quarter" idx="10"/>
+          </p:nvPr>
+        </p:nvSpPr>
+        <p:spPr/>
+        <p:txBody>
+          <a:bodyPr/>
+          <a:lstStyle/>
+          <a:p>
+            <a:fld id="{D633CFC9-9EA6-1241-A510-5FCAF76A6332}" type="slidenum">
+              <a:rPr lang="en-US" smtClean="0"/>
+              <a:t>23</a:t>
+            </a:fld>
+            <a:endParaRPr lang="en-US"/>
+          </a:p>
+        </p:txBody>
+      </p:sp>
+    </p:spTree>
+    <p:extLst>
+      <p:ext uri="{BB962C8B-B14F-4D97-AF65-F5344CB8AC3E}">
+        <p14:creationId xmlns:p14="http://schemas.microsoft.com/office/powerpoint/2010/main" val="1613277740"/>
+      </p:ext>
+    </p:extLst>
+  </p:cSld>
+  <p:clrMapOvr>
+    <a:masterClrMapping/>
+  </p:clrMapOvr>
+</p:notes>
+</file>
+
+<file path=ppt/notesSlides/notesSlide24.xml><?xml version="1.0" encoding="utf-8"?>
+<p:notes xmlns:a="http://schemas.openxmlformats.org/drawingml/2006/main" xmlns:r="http://schemas.openxmlformats.org/officeDocument/2006/relationships" xmlns:p="http://schemas.openxmlformats.org/presentationml/2006/main">
+  <p:cSld>
+    <p:spTree>
+      <p:nvGrpSpPr>
+        <p:cNvPr id="1" name=""/>
+        <p:cNvGrpSpPr/>
+        <p:nvPr/>
+      </p:nvGrpSpPr>
+      <p:grpSpPr>
+        <a:xfrm>
+          <a:off x="0" y="0"/>
+          <a:ext cx="0" cy="0"/>
+          <a:chOff x="0" y="0"/>
+          <a:chExt cx="0" cy="0"/>
+        </a:xfrm>
+      </p:grpSpPr>
+      <p:sp>
+        <p:nvSpPr>
+          <p:cNvPr id="2" name="Slide Image Placeholder 1"/>
+          <p:cNvSpPr>
+            <a:spLocks noGrp="1" noRot="1" noChangeAspect="1"/>
+          </p:cNvSpPr>
+          <p:nvPr>
+            <p:ph type="sldImg"/>
+          </p:nvPr>
+        </p:nvSpPr>
+        <p:spPr/>
+      </p:sp>
+      <p:sp>
+        <p:nvSpPr>
+          <p:cNvPr id="3" name="Notes Placeholder 2"/>
+          <p:cNvSpPr>
+            <a:spLocks noGrp="1"/>
+          </p:cNvSpPr>
+          <p:nvPr>
+            <p:ph type="body" idx="1"/>
+          </p:nvPr>
+        </p:nvSpPr>
+        <p:spPr/>
+        <p:txBody>
+          <a:bodyPr/>
+          <a:lstStyle/>
+          <a:p>
+            <a:r>
+              <a:rPr lang="en-US" dirty="0" smtClean="0"/>
+              <a:t>Twitter</a:t>
+            </a:r>
+            <a:r>
+              <a:rPr lang="en-US" baseline="0" dirty="0" smtClean="0"/>
+              <a:t> is using node to compile Less to CSS</a:t>
+            </a:r>
+          </a:p>
+          <a:p>
+            <a:pPr marL="0" marR="0" indent="0" algn="l" defTabSz="457200" rtl="0" eaLnBrk="1" fontAlgn="auto" latinLnBrk="0" hangingPunct="1">
+              <a:lnSpc>
+                <a:spcPct val="100000"/>
+              </a:lnSpc>
+              <a:spcBef>
+                <a:spcPts val="0"/>
+              </a:spcBef>
+              <a:spcAft>
+                <a:spcPts val="0"/>
+              </a:spcAft>
+              <a:buClrTx/>
+              <a:buSzTx/>
+              <a:buFontTx/>
+              <a:buNone/>
+              <a:tabLst/>
+              <a:defRPr/>
+            </a:pPr>
+            <a:r>
+              <a:rPr lang="en-US" baseline="0" dirty="0" smtClean="0"/>
+              <a:t>Yahoo can’t say yet</a:t>
+            </a:r>
+          </a:p>
+          <a:p>
+            <a:pPr marL="0" marR="0" indent="0" algn="l" defTabSz="457200" rtl="0" eaLnBrk="1" fontAlgn="auto" latinLnBrk="0" hangingPunct="1">
+              <a:lnSpc>
+                <a:spcPct val="100000"/>
+              </a:lnSpc>
+              <a:spcBef>
+                <a:spcPts val="0"/>
+              </a:spcBef>
+              <a:spcAft>
+                <a:spcPts val="0"/>
+              </a:spcAft>
+              <a:buClrTx/>
+              <a:buSzTx/>
+              <a:buFontTx/>
+              <a:buNone/>
+              <a:tabLst/>
+              <a:defRPr/>
+            </a:pPr>
+            <a:r>
+              <a:rPr lang="en-US" baseline="0" dirty="0" err="1" smtClean="0"/>
+              <a:t>Bocoup</a:t>
+            </a:r>
+            <a:r>
+              <a:rPr lang="en-US" baseline="0" dirty="0" smtClean="0"/>
+              <a:t> built IRC bot for logging/stats</a:t>
+            </a:r>
+          </a:p>
+          <a:p>
+            <a:pPr marL="0" marR="0" indent="0" algn="l" defTabSz="457200" rtl="0" eaLnBrk="1" fontAlgn="auto" latinLnBrk="0" hangingPunct="1">
+              <a:lnSpc>
+                <a:spcPct val="100000"/>
+              </a:lnSpc>
+              <a:spcBef>
+                <a:spcPts val="0"/>
+              </a:spcBef>
+              <a:spcAft>
+                <a:spcPts val="0"/>
+              </a:spcAft>
+              <a:buClrTx/>
+              <a:buSzTx/>
+              <a:buFontTx/>
+              <a:buNone/>
+              <a:tabLst/>
+              <a:defRPr/>
+            </a:pPr>
+            <a:r>
+              <a:rPr lang="en-US" baseline="0" dirty="0" err="1" smtClean="0"/>
+              <a:t>Proxlet’s</a:t>
+            </a:r>
+            <a:r>
+              <a:rPr lang="en-US" baseline="0" dirty="0" smtClean="0"/>
+              <a:t> plugin uses node as the proxy</a:t>
+            </a:r>
+          </a:p>
+          <a:p>
+            <a:pPr marL="0" marR="0" indent="0" algn="l" defTabSz="457200" rtl="0" eaLnBrk="1" fontAlgn="auto" latinLnBrk="0" hangingPunct="1">
+              <a:lnSpc>
+                <a:spcPct val="100000"/>
+              </a:lnSpc>
+              <a:spcBef>
+                <a:spcPts val="0"/>
+              </a:spcBef>
+              <a:spcAft>
+                <a:spcPts val="0"/>
+              </a:spcAft>
+              <a:buClrTx/>
+              <a:buSzTx/>
+              <a:buFontTx/>
+              <a:buNone/>
+              <a:tabLst/>
+              <a:defRPr/>
+            </a:pPr>
+            <a:r>
+              <a:rPr lang="en-US" baseline="0" dirty="0" smtClean="0"/>
+              <a:t>Yammer uses node as a proxy for it’s API</a:t>
+            </a:r>
+          </a:p>
+          <a:p>
+            <a:pPr marL="0" marR="0" indent="0" algn="l" defTabSz="457200" rtl="0" eaLnBrk="1" fontAlgn="auto" latinLnBrk="0" hangingPunct="1">
+              <a:lnSpc>
+                <a:spcPct val="100000"/>
+              </a:lnSpc>
+              <a:spcBef>
+                <a:spcPts val="0"/>
+              </a:spcBef>
+              <a:spcAft>
+                <a:spcPts val="0"/>
+              </a:spcAft>
+              <a:buClrTx/>
+              <a:buSzTx/>
+              <a:buFontTx/>
+              <a:buNone/>
+              <a:tabLst/>
+              <a:defRPr/>
+            </a:pPr>
+            <a:r>
+              <a:rPr lang="en-US" baseline="0" dirty="0" smtClean="0"/>
+              <a:t>Worth mentioning that MS is working with </a:t>
+            </a:r>
+            <a:r>
+              <a:rPr lang="en-US" baseline="0" dirty="0" err="1" smtClean="0"/>
+              <a:t>Joyent</a:t>
+            </a:r>
+            <a:r>
+              <a:rPr lang="en-US" baseline="0" dirty="0" smtClean="0"/>
+              <a:t> on the win port of node/</a:t>
+            </a:r>
+            <a:r>
+              <a:rPr lang="en-US" baseline="0" dirty="0" err="1" smtClean="0"/>
+              <a:t>libuv</a:t>
+            </a:r>
+            <a:endParaRPr lang="en-US" baseline="0" dirty="0" smtClean="0"/>
+          </a:p>
+          <a:p>
+            <a:pPr marL="0" marR="0" indent="0" algn="l" defTabSz="457200" rtl="0" eaLnBrk="1" fontAlgn="auto" latinLnBrk="0" hangingPunct="1">
+              <a:lnSpc>
+                <a:spcPct val="100000"/>
+              </a:lnSpc>
+              <a:spcBef>
+                <a:spcPts val="0"/>
+              </a:spcBef>
+              <a:spcAft>
+                <a:spcPts val="0"/>
+              </a:spcAft>
+              <a:buClrTx/>
+              <a:buSzTx/>
+              <a:buFontTx/>
+              <a:buNone/>
+              <a:tabLst/>
+              <a:defRPr/>
+            </a:pPr>
+            <a:r>
+              <a:rPr lang="en-US" baseline="0" dirty="0" smtClean="0"/>
+              <a:t>LinkedIn uses node for the mobile server side stack</a:t>
+            </a:r>
+          </a:p>
+          <a:p>
+            <a:pPr marL="0" marR="0" indent="0" algn="l" defTabSz="457200" rtl="0" eaLnBrk="1" fontAlgn="auto" latinLnBrk="0" hangingPunct="1">
+              <a:lnSpc>
+                <a:spcPct val="100000"/>
+              </a:lnSpc>
+              <a:spcBef>
+                <a:spcPts val="0"/>
+              </a:spcBef>
+              <a:spcAft>
+                <a:spcPts val="0"/>
+              </a:spcAft>
+              <a:buClrTx/>
+              <a:buSzTx/>
+              <a:buFontTx/>
+              <a:buNone/>
+              <a:tabLst/>
+              <a:defRPr/>
+            </a:pPr>
+            <a:endParaRPr lang="en-US" baseline="0" dirty="0" smtClean="0"/>
+          </a:p>
+          <a:p>
+            <a:pPr marL="0" marR="0" indent="0" algn="l" defTabSz="457200" rtl="0" eaLnBrk="1" fontAlgn="auto" latinLnBrk="0" hangingPunct="1">
+              <a:lnSpc>
+                <a:spcPct val="100000"/>
+              </a:lnSpc>
+              <a:spcBef>
+                <a:spcPts val="0"/>
+              </a:spcBef>
+              <a:spcAft>
+                <a:spcPts val="0"/>
+              </a:spcAft>
+              <a:buClrTx/>
+              <a:buSzTx/>
+              <a:buFontTx/>
+              <a:buNone/>
+              <a:tabLst/>
+              <a:defRPr/>
+            </a:pPr>
+            <a:endParaRPr lang="en-US" baseline="0" dirty="0" smtClean="0"/>
+          </a:p>
+        </p:txBody>
+      </p:sp>
+      <p:sp>
+        <p:nvSpPr>
+          <p:cNvPr id="4" name="Slide Number Placeholder 3"/>
+          <p:cNvSpPr>
+            <a:spLocks noGrp="1"/>
+          </p:cNvSpPr>
+          <p:nvPr>
+            <p:ph type="sldNum" sz="quarter" idx="10"/>
+          </p:nvPr>
+        </p:nvSpPr>
+        <p:spPr/>
+        <p:txBody>
+          <a:bodyPr/>
+          <a:lstStyle/>
+          <a:p>
+            <a:fld id="{D633CFC9-9EA6-1241-A510-5FCAF76A6332}" type="slidenum">
+              <a:rPr lang="en-US" smtClean="0"/>
+              <a:t>24</a:t>
+            </a:fld>
+            <a:endParaRPr lang="en-US"/>
+          </a:p>
+        </p:txBody>
+      </p:sp>
+    </p:spTree>
+    <p:extLst>
+      <p:ext uri="{BB962C8B-B14F-4D97-AF65-F5344CB8AC3E}">
+        <p14:creationId xmlns:p14="http://schemas.microsoft.com/office/powerpoint/2010/main" val="1890685000"/>
+      </p:ext>
+    </p:extLst>
+  </p:cSld>
+  <p:clrMapOvr>
+    <a:masterClrMapping/>
+  </p:clrMapOvr>
+</p:notes>
+</file>
+
+<file path=ppt/notesSlides/notesSlide25.xml><?xml version="1.0" encoding="utf-8"?>
+<p:notes xmlns:a="http://schemas.openxmlformats.org/drawingml/2006/main" xmlns:r="http://schemas.openxmlformats.org/officeDocument/2006/relationships" xmlns:p="http://schemas.openxmlformats.org/presentationml/2006/main">
+  <p:cSld>
+    <p:spTree>
+      <p:nvGrpSpPr>
+        <p:cNvPr id="1" name=""/>
+        <p:cNvGrpSpPr/>
+        <p:nvPr/>
+      </p:nvGrpSpPr>
+      <p:grpSpPr>
+        <a:xfrm>
+          <a:off x="0" y="0"/>
+          <a:ext cx="0" cy="0"/>
+          <a:chOff x="0" y="0"/>
+          <a:chExt cx="0" cy="0"/>
+        </a:xfrm>
+      </p:grpSpPr>
+      <p:sp>
+        <p:nvSpPr>
+          <p:cNvPr id="2" name="Slide Image Placeholder 1"/>
+          <p:cNvSpPr>
+            <a:spLocks noGrp="1" noRot="1" noChangeAspect="1"/>
+          </p:cNvSpPr>
+          <p:nvPr>
+            <p:ph type="sldImg"/>
+          </p:nvPr>
+        </p:nvSpPr>
+        <p:spPr/>
+      </p:sp>
+      <p:sp>
+        <p:nvSpPr>
+          <p:cNvPr id="3" name="Notes Placeholder 2"/>
+          <p:cNvSpPr>
+            <a:spLocks noGrp="1"/>
+          </p:cNvSpPr>
+          <p:nvPr>
+            <p:ph type="body" idx="1"/>
+          </p:nvPr>
+        </p:nvSpPr>
+        <p:spPr/>
+        <p:txBody>
+          <a:bodyPr/>
+          <a:lstStyle/>
+          <a:p>
+            <a:r>
+              <a:rPr lang="en-US" dirty="0" smtClean="0"/>
+              <a:t>READ CODE READ CODE READ CODE</a:t>
+            </a:r>
+          </a:p>
+          <a:p>
+            <a:r>
+              <a:rPr lang="en-US" dirty="0" smtClean="0"/>
+              <a:t>Tim</a:t>
+            </a:r>
+            <a:r>
+              <a:rPr lang="en-US" baseline="0" dirty="0" smtClean="0"/>
+              <a:t> Caswell will melt your brain in a good way</a:t>
+            </a:r>
+            <a:endParaRPr lang="en-US" dirty="0"/>
+          </a:p>
+        </p:txBody>
+      </p:sp>
+      <p:sp>
+        <p:nvSpPr>
+          <p:cNvPr id="4" name="Slide Number Placeholder 3"/>
+          <p:cNvSpPr>
+            <a:spLocks noGrp="1"/>
+          </p:cNvSpPr>
+          <p:nvPr>
+            <p:ph type="sldNum" sz="quarter" idx="10"/>
+          </p:nvPr>
+        </p:nvSpPr>
+        <p:spPr/>
+        <p:txBody>
+          <a:bodyPr/>
+          <a:lstStyle/>
+          <a:p>
+            <a:fld id="{D633CFC9-9EA6-1241-A510-5FCAF76A6332}" type="slidenum">
+              <a:rPr lang="en-US" smtClean="0"/>
+              <a:t>25</a:t>
+            </a:fld>
+            <a:endParaRPr lang="en-US"/>
+          </a:p>
+        </p:txBody>
+      </p:sp>
+    </p:spTree>
+    <p:extLst>
+      <p:ext uri="{BB962C8B-B14F-4D97-AF65-F5344CB8AC3E}">
+        <p14:creationId xmlns:p14="http://schemas.microsoft.com/office/powerpoint/2010/main" val="30431674"/>
+      </p:ext>
+    </p:extLst>
+  </p:cSld>
+  <p:clrMapOvr>
+    <a:masterClrMapping/>
+  </p:clrMapOvr>
+</p:notes>
+</file>
+
+<file path=ppt/notesSlides/notesSlide26.xml><?xml version="1.0" encoding="utf-8"?>
+<p:notes xmlns:a="http://schemas.openxmlformats.org/drawingml/2006/main" xmlns:r="http://schemas.openxmlformats.org/officeDocument/2006/relationships" xmlns:p="http://schemas.openxmlformats.org/presentationml/2006/main">
+  <p:cSld>
+    <p:spTree>
+      <p:nvGrpSpPr>
+        <p:cNvPr id="1" name=""/>
+        <p:cNvGrpSpPr/>
+        <p:nvPr/>
+      </p:nvGrpSpPr>
+      <p:grpSpPr>
+        <a:xfrm>
+          <a:off x="0" y="0"/>
+          <a:ext cx="0" cy="0"/>
+          <a:chOff x="0" y="0"/>
+          <a:chExt cx="0" cy="0"/>
+        </a:xfrm>
+      </p:grpSpPr>
+      <p:sp>
+        <p:nvSpPr>
+          <p:cNvPr id="2" name="Slide Image Placeholder 1"/>
+          <p:cNvSpPr>
+            <a:spLocks noGrp="1" noRot="1" noChangeAspect="1"/>
+          </p:cNvSpPr>
+          <p:nvPr>
+            <p:ph type="sldImg"/>
+          </p:nvPr>
+        </p:nvSpPr>
+        <p:spPr/>
+      </p:sp>
+      <p:sp>
+        <p:nvSpPr>
+          <p:cNvPr id="3" name="Notes Placeholder 2"/>
+          <p:cNvSpPr>
+            <a:spLocks noGrp="1"/>
+          </p:cNvSpPr>
+          <p:nvPr>
+            <p:ph type="body" idx="1"/>
+          </p:nvPr>
+        </p:nvSpPr>
+        <p:spPr/>
+        <p:txBody>
+          <a:bodyPr/>
+          <a:lstStyle/>
+          <a:p>
+            <a:endParaRPr lang="en-US"/>
+          </a:p>
+        </p:txBody>
+      </p:sp>
+      <p:sp>
+        <p:nvSpPr>
+          <p:cNvPr id="4" name="Slide Number Placeholder 3"/>
+          <p:cNvSpPr>
+            <a:spLocks noGrp="1"/>
+          </p:cNvSpPr>
+          <p:nvPr>
+            <p:ph type="sldNum" sz="quarter" idx="10"/>
+          </p:nvPr>
+        </p:nvSpPr>
+        <p:spPr/>
+        <p:txBody>
+          <a:bodyPr/>
+          <a:lstStyle/>
+          <a:p>
+            <a:fld id="{D633CFC9-9EA6-1241-A510-5FCAF76A6332}" type="slidenum">
+              <a:rPr lang="en-US" smtClean="0"/>
+              <a:t>26</a:t>
+            </a:fld>
+            <a:endParaRPr lang="en-US"/>
+          </a:p>
+        </p:txBody>
+      </p:sp>
+    </p:spTree>
+    <p:extLst>
+      <p:ext uri="{BB962C8B-B14F-4D97-AF65-F5344CB8AC3E}">
+        <p14:creationId xmlns:p14="http://schemas.microsoft.com/office/powerpoint/2010/main" val="1653451184"/>
       </p:ext>
     </p:extLst>
   </p:cSld>
@@ -2029,22 +2735,63 @@
           <a:lstStyle/>
           <a:p>
             <a:r>
-              <a:rPr lang="en-US" dirty="0" smtClean="0"/>
-              <a:t>Maybe explain that Ryan</a:t>
-            </a:r>
-            <a:r>
-              <a:rPr lang="en-US" baseline="0" dirty="0" smtClean="0"/>
-              <a:t> originally looked at </a:t>
-            </a:r>
-            <a:r>
-              <a:rPr lang="en-US" baseline="0" dirty="0" err="1" smtClean="0"/>
-              <a:t>Lua</a:t>
-            </a:r>
-            <a:r>
-              <a:rPr lang="en-US" baseline="0" dirty="0" smtClean="0"/>
-              <a:t>….but blocking libs made it an issue.  This is a complaint leveled at Twisted as well….blocking python libs</a:t>
-            </a:r>
-            <a:endParaRPr lang="en-US" dirty="0"/>
+              <a:rPr lang="en-US" sz="1200" kern="1200" dirty="0" smtClean="0">
+                <a:solidFill>
+                  <a:schemeClr val="tx1"/>
+                </a:solidFill>
+                <a:latin typeface="+mn-lt"/>
+                <a:ea typeface="+mn-ea"/>
+                <a:cs typeface="+mn-cs"/>
+              </a:rPr>
+              <a:t>"We're taught to demand input and do nothing until we have it” (Ryan)</a:t>
+            </a:r>
+          </a:p>
+          <a:p>
+            <a:r>
+              <a:rPr lang="en-US" sz="1200" kern="1200" dirty="0" smtClean="0">
+                <a:solidFill>
+                  <a:schemeClr val="tx1"/>
+                </a:solidFill>
+                <a:latin typeface="+mn-lt"/>
+                <a:ea typeface="+mn-ea"/>
+                <a:cs typeface="+mn-cs"/>
+              </a:rPr>
+              <a:t>“I’m not afraid</a:t>
+            </a:r>
+            <a:r>
+              <a:rPr lang="en-US" sz="1200" kern="1200" baseline="0" dirty="0" smtClean="0">
+                <a:solidFill>
+                  <a:schemeClr val="tx1"/>
+                </a:solidFill>
+                <a:latin typeface="+mn-lt"/>
+                <a:ea typeface="+mn-ea"/>
+                <a:cs typeface="+mn-cs"/>
+              </a:rPr>
+              <a:t> of threads”…since when is debugging thread bugs easy?</a:t>
+            </a:r>
+          </a:p>
+          <a:p>
+            <a:r>
+              <a:rPr lang="en-US" sz="1200" kern="1200" baseline="0" dirty="0" smtClean="0">
+                <a:solidFill>
+                  <a:schemeClr val="tx1"/>
+                </a:solidFill>
+                <a:latin typeface="+mn-lt"/>
+                <a:ea typeface="+mn-ea"/>
+                <a:cs typeface="+mn-cs"/>
+              </a:rPr>
+              <a:t>KNOW when your code is going to yield</a:t>
+            </a:r>
+          </a:p>
+          <a:p>
+            <a:endParaRPr lang="en-US" sz="1200" kern="1200" baseline="0" dirty="0" smtClean="0">
+              <a:solidFill>
+                <a:schemeClr val="tx1"/>
+              </a:solidFill>
+              <a:latin typeface="+mn-lt"/>
+              <a:ea typeface="+mn-ea"/>
+              <a:cs typeface="+mn-cs"/>
+            </a:endParaRPr>
           </a:p>
         </p:txBody>
       </p:sp>
@@ -2065,7 +2812,7 @@
           <a:p>
             <a:fld id="{D633CFC9-9EA6-1241-A510-5FCAF76A6332}" type="slidenum">
               <a:rPr lang="en-US" smtClean="0"/>
-              <a:t>4</a:t>
+              <a:t>3</a:t>
             </a:fld>
             <a:endParaRPr lang="en-US"/>
           </a:p>
@@ -2074,7 +2821,7 @@
     </p:spTree>
     <p:extLst>
       <p:ext uri="{BB962C8B-B14F-4D97-AF65-F5344CB8AC3E}">
-        <p14:creationId xmlns:p14="http://schemas.microsoft.com/office/powerpoint/2010/main" val="4088091038"/>
+        <p14:creationId xmlns:p14="http://schemas.microsoft.com/office/powerpoint/2010/main" val="1220171817"/>
       </p:ext>
     </p:extLst>
   </p:cSld>
@@ -2130,27 +2877,19 @@
           <a:p>
             <a:r>
               <a:rPr lang="en-US" dirty="0" smtClean="0"/>
-              <a:t>Explain</a:t>
+              <a:t>Maybe explain that Ryan</a:t>
             </a:r>
             <a:r>
               <a:rPr lang="en-US" baseline="0" dirty="0" smtClean="0"/>
-              <a:t> callback is </a:t>
+              <a:t> originally looked at </a:t>
             </a:r>
             <a:r>
               <a:rPr lang="en-US" baseline="0" dirty="0" err="1" smtClean="0"/>
-              <a:t>enqueued</a:t>
+              <a:t>Lua</a:t>
             </a:r>
             <a:r>
               <a:rPr lang="en-US" baseline="0" dirty="0" smtClean="0"/>
-              <a:t>/</a:t>
-            </a:r>
-            <a:r>
-              <a:rPr lang="en-US" baseline="0" dirty="0" err="1" smtClean="0"/>
-              <a:t>dequeued</a:t>
-            </a:r>
-            <a:r>
-              <a:rPr lang="en-US" baseline="0" dirty="0" smtClean="0"/>
-              <a:t> immediately on event loop.</a:t>
+              <a:t>….but blocking libs made it an issue.  This is a complaint leveled at Twisted as well….blocking python libs</a:t>
             </a:r>
             <a:endParaRPr lang="en-US" dirty="0"/>
           </a:p>
@@ -2173,7 +2912,7 @@
           <a:p>
             <a:fld id="{D633CFC9-9EA6-1241-A510-5FCAF76A6332}" type="slidenum">
               <a:rPr lang="en-US" smtClean="0"/>
-              <a:t>8</a:t>
+              <a:t>4</a:t>
             </a:fld>
             <a:endParaRPr lang="en-US"/>
           </a:p>
@@ -2182,7 +2921,7 @@
     </p:spTree>
     <p:extLst>
       <p:ext uri="{BB962C8B-B14F-4D97-AF65-F5344CB8AC3E}">
-        <p14:creationId xmlns:p14="http://schemas.microsoft.com/office/powerpoint/2010/main" val="1240346247"/>
+        <p14:creationId xmlns:p14="http://schemas.microsoft.com/office/powerpoint/2010/main" val="4088091038"/>
       </p:ext>
     </p:extLst>
   </p:cSld>
@@ -2236,23 +2975,7 @@
           <a:bodyPr/>
           <a:lstStyle/>
           <a:p>
-            <a:r>
-              <a:rPr lang="en-US" dirty="0" smtClean="0"/>
-              <a:t>Node standard</a:t>
-            </a:r>
-            <a:r>
-              <a:rPr lang="en-US" baseline="0" dirty="0" smtClean="0"/>
-              <a:t> lib includes things like net, http, </a:t>
-            </a:r>
-            <a:r>
-              <a:rPr lang="en-US" baseline="0" dirty="0" err="1" smtClean="0"/>
-              <a:t>querystring</a:t>
-            </a:r>
-            <a:r>
-              <a:rPr lang="en-US" baseline="0" dirty="0" smtClean="0"/>
-              <a:t>, events, child process, etc.</a:t>
-            </a:r>
-            <a:endParaRPr lang="en-US" dirty="0"/>
+            <a:endParaRPr lang="en-US"/>
           </a:p>
         </p:txBody>
       </p:sp>
@@ -2273,7 +2996,7 @@
           <a:p>
             <a:fld id="{D633CFC9-9EA6-1241-A510-5FCAF76A6332}" type="slidenum">
               <a:rPr lang="en-US" smtClean="0"/>
-              <a:t>9</a:t>
+              <a:t>5</a:t>
             </a:fld>
             <a:endParaRPr lang="en-US"/>
           </a:p>
@@ -2282,7 +3005,7 @@
     </p:spTree>
     <p:extLst>
       <p:ext uri="{BB962C8B-B14F-4D97-AF65-F5344CB8AC3E}">
-        <p14:creationId xmlns:p14="http://schemas.microsoft.com/office/powerpoint/2010/main" val="3435753256"/>
+        <p14:creationId xmlns:p14="http://schemas.microsoft.com/office/powerpoint/2010/main" val="3930022302"/>
       </p:ext>
     </p:extLst>
   </p:cSld>
@@ -2336,44 +3059,7 @@
           <a:bodyPr/>
           <a:lstStyle/>
           <a:p>
-            <a:r>
-              <a:rPr lang="en-US" dirty="0" smtClean="0"/>
-              <a:t>Those worry</a:t>
-            </a:r>
-            <a:r>
-              <a:rPr lang="en-US" baseline="0" dirty="0" smtClean="0"/>
-              <a:t> moments are more about changing the way we think.  We’ve been taught programming through a synchronous lens.</a:t>
-            </a:r>
-          </a:p>
-          <a:p>
-            <a:pPr marL="0" marR="0" indent="0" algn="l" defTabSz="457200" rtl="0" eaLnBrk="1" fontAlgn="auto" latinLnBrk="0" hangingPunct="1">
-              <a:lnSpc>
-                <a:spcPct val="100000"/>
-              </a:lnSpc>
-              <a:spcBef>
-                <a:spcPts val="0"/>
-              </a:spcBef>
-              <a:spcAft>
-                <a:spcPts val="0"/>
-              </a:spcAft>
-              <a:buClrTx/>
-              <a:buSzTx/>
-              <a:buFontTx/>
-              <a:buNone/>
-              <a:tabLst/>
-              <a:defRPr/>
-            </a:pPr>
-            <a:r>
-              <a:rPr lang="en-US" sz="1200" kern="1200" dirty="0" smtClean="0">
-                <a:solidFill>
-                  <a:schemeClr val="tx1"/>
-                </a:solidFill>
-                <a:latin typeface="+mn-lt"/>
-                <a:ea typeface="+mn-ea"/>
-                <a:cs typeface="+mn-cs"/>
-              </a:rPr>
-              <a:t>"We're taught to demand input and do nothing until we have it” (Ryan)</a:t>
-            </a:r>
+            <a:endParaRPr lang="en-US"/>
           </a:p>
         </p:txBody>
       </p:sp>
@@ -2394,7 +3080,7 @@
           <a:p>
             <a:fld id="{D633CFC9-9EA6-1241-A510-5FCAF76A6332}" type="slidenum">
               <a:rPr lang="en-US" smtClean="0"/>
-              <a:t>10</a:t>
+              <a:t>6</a:t>
             </a:fld>
             <a:endParaRPr lang="en-US"/>
           </a:p>
@@ -2403,7 +3089,7 @@
     </p:spTree>
     <p:extLst>
       <p:ext uri="{BB962C8B-B14F-4D97-AF65-F5344CB8AC3E}">
-        <p14:creationId xmlns:p14="http://schemas.microsoft.com/office/powerpoint/2010/main" val="3320040173"/>
+        <p14:creationId xmlns:p14="http://schemas.microsoft.com/office/powerpoint/2010/main" val="563641797"/>
       </p:ext>
     </p:extLst>
   </p:cSld>
@@ -2457,37 +3143,7 @@
           <a:bodyPr/>
           <a:lstStyle/>
           <a:p>
-            <a:r>
-              <a:rPr lang="en-US" dirty="0" smtClean="0"/>
-              <a:t>If an event loop behaves</a:t>
-            </a:r>
-            <a:r>
-              <a:rPr lang="en-US" baseline="0" dirty="0" smtClean="0"/>
-              <a:t> badly, it’s really a developer issue.</a:t>
-            </a:r>
-          </a:p>
-          <a:p>
-            <a:r>
-              <a:rPr lang="en-US" baseline="0" dirty="0" smtClean="0"/>
-              <a:t>Ex. – </a:t>
-            </a:r>
-            <a:r>
-              <a:rPr lang="en-US" baseline="0" dirty="0" err="1" smtClean="0"/>
-              <a:t>winforms</a:t>
-            </a:r>
-            <a:r>
-              <a:rPr lang="en-US" baseline="0" dirty="0" smtClean="0"/>
-              <a:t> or WPF UI w/long running operation….or web page with sync </a:t>
-            </a:r>
-            <a:r>
-              <a:rPr lang="en-US" baseline="0" dirty="0" err="1" smtClean="0"/>
-              <a:t>ajax</a:t>
-            </a:r>
-            <a:r>
-              <a:rPr lang="en-US" baseline="0" dirty="0" smtClean="0"/>
-              <a:t> call….</a:t>
-            </a:r>
-            <a:endParaRPr lang="en-US" dirty="0"/>
+            <a:endParaRPr lang="en-US"/>
           </a:p>
         </p:txBody>
       </p:sp>
@@ -2508,7 +3164,7 @@
           <a:p>
             <a:fld id="{D633CFC9-9EA6-1241-A510-5FCAF76A6332}" type="slidenum">
               <a:rPr lang="en-US" smtClean="0"/>
-              <a:t>12</a:t>
+              <a:t>7</a:t>
             </a:fld>
             <a:endParaRPr lang="en-US"/>
           </a:p>
@@ -2517,7 +3173,7 @@
     </p:spTree>
     <p:extLst>
       <p:ext uri="{BB962C8B-B14F-4D97-AF65-F5344CB8AC3E}">
-        <p14:creationId xmlns:p14="http://schemas.microsoft.com/office/powerpoint/2010/main" val="2771658809"/>
+        <p14:creationId xmlns:p14="http://schemas.microsoft.com/office/powerpoint/2010/main" val="2569358900"/>
       </p:ext>
     </p:extLst>
   </p:cSld>
@@ -2573,20 +3229,27 @@
           <a:p>
             <a:r>
               <a:rPr lang="en-US" dirty="0" smtClean="0"/>
-              <a:t>Client</a:t>
+              <a:t>Explain</a:t>
             </a:r>
             <a:r>
               <a:rPr lang="en-US" baseline="0" dirty="0" smtClean="0"/>
-              <a:t> A, the SYNCHRONOUS LOOP HOG</a:t>
-            </a:r>
-          </a:p>
-          <a:p>
-            <a:endParaRPr lang="en-US" baseline="0" dirty="0" smtClean="0"/>
-          </a:p>
-          <a:p>
+              <a:t> callback is </a:t>
+            </a:r>
+            <a:r>
+              <a:rPr lang="en-US" baseline="0" dirty="0" err="1" smtClean="0"/>
+              <a:t>enqueued</a:t>
+            </a:r>
             <a:r>
               <a:rPr lang="en-US" baseline="0" dirty="0" smtClean="0"/>
-              <a:t>So the deal is – you have to worry if you do something stupid…</a:t>
+              <a:t>/</a:t>
+            </a:r>
+            <a:r>
+              <a:rPr lang="en-US" baseline="0" dirty="0" err="1" smtClean="0"/>
+              <a:t>dequeued</a:t>
+            </a:r>
+            <a:r>
+              <a:rPr lang="en-US" baseline="0" dirty="0" smtClean="0"/>
+              <a:t> immediately on event loop.</a:t>
             </a:r>
             <a:endParaRPr lang="en-US" dirty="0"/>
           </a:p>
@@ -2609,7 +3272,7 @@
           <a:p>
             <a:fld id="{D633CFC9-9EA6-1241-A510-5FCAF76A6332}" type="slidenum">
               <a:rPr lang="en-US" smtClean="0"/>
-              <a:t>13</a:t>
+              <a:t>8</a:t>
             </a:fld>
             <a:endParaRPr lang="en-US"/>
           </a:p>
@@ -2618,7 +3281,7 @@
     </p:spTree>
     <p:extLst>
       <p:ext uri="{BB962C8B-B14F-4D97-AF65-F5344CB8AC3E}">
-        <p14:creationId xmlns:p14="http://schemas.microsoft.com/office/powerpoint/2010/main" val="3252182806"/>
+        <p14:creationId xmlns:p14="http://schemas.microsoft.com/office/powerpoint/2010/main" val="1240346247"/>
       </p:ext>
     </p:extLst>
   </p:cSld>
@@ -2674,11 +3337,19 @@
           <a:p>
             <a:r>
               <a:rPr lang="en-US" dirty="0" smtClean="0"/>
-              <a:t>This is Node!</a:t>
+              <a:t>Node standard</a:t>
             </a:r>
             <a:r>
               <a:rPr lang="en-US" baseline="0" dirty="0" smtClean="0"/>
-              <a:t>  If you’re I/O bound, it’s the sweet spot.  It’s not where you need to be running intensive spatial calculations, crawling huge graphs, etc.</a:t>
+              <a:t> lib includes things like net, http, </a:t>
+            </a:r>
+            <a:r>
+              <a:rPr lang="en-US" baseline="0" dirty="0" err="1" smtClean="0"/>
+              <a:t>querystring</a:t>
+            </a:r>
+            <a:r>
+              <a:rPr lang="en-US" baseline="0" dirty="0" smtClean="0"/>
+              <a:t>, events, child process, etc.</a:t>
             </a:r>
             <a:endParaRPr lang="en-US" dirty="0"/>
           </a:p>
@@ -2701,7 +3372,7 @@
           <a:p>
             <a:fld id="{D633CFC9-9EA6-1241-A510-5FCAF76A6332}" type="slidenum">
               <a:rPr lang="en-US" smtClean="0"/>
-              <a:t>14</a:t>
+              <a:t>9</a:t>
             </a:fld>
             <a:endParaRPr lang="en-US"/>
           </a:p>
@@ -2710,7 +3381,7 @@
     </p:spTree>
     <p:extLst>
       <p:ext uri="{BB962C8B-B14F-4D97-AF65-F5344CB8AC3E}">
-        <p14:creationId xmlns:p14="http://schemas.microsoft.com/office/powerpoint/2010/main" val="3453378653"/>
+        <p14:creationId xmlns:p14="http://schemas.microsoft.com/office/powerpoint/2010/main" val="3435753256"/>
       </p:ext>
     </p:extLst>
   </p:cSld>
@@ -5865,14 +6536,6 @@
               </a:rPr>
               <a:t>ode.js</a:t>
             </a:r>
-            <a:r>
-              <a:rPr lang="en-US" sz="4800" dirty="0" smtClean="0">
-                <a:solidFill>
-                  <a:srgbClr val="FFFFFF"/>
-                </a:solidFill>
-              </a:rPr>
-              <a:t/>
-            </a:r>
             <a:br>
               <a:rPr lang="en-US" sz="4800" dirty="0" smtClean="0">
                 <a:solidFill>
@@ -5900,13 +6563,13 @@
         </p:nvSpPr>
         <p:spPr>
           <a:xfrm>
-            <a:off x="599859" y="4304656"/>
-            <a:ext cx="6461760" cy="1066800"/>
+            <a:off x="599859" y="3981603"/>
+            <a:ext cx="6461760" cy="1389853"/>
           </a:xfrm>
         </p:spPr>
         <p:txBody>
           <a:bodyPr>
-            <a:normAutofit fontScale="77500" lnSpcReduction="20000"/>
+            <a:normAutofit fontScale="85000" lnSpcReduction="20000"/>
           </a:bodyPr>
           <a:lstStyle/>
           <a:p>
@@ -5927,6 +6590,16 @@
                 </a:solidFill>
               </a:rPr>
               <a:t>Blog:	http://www.ifandelse.com</a:t>
+            </a:r>
+          </a:p>
+          <a:p>
+            <a:r>
+              <a:rPr lang="en-US" dirty="0" smtClean="0">
+                <a:solidFill>
+                  <a:srgbClr val="FFFFFF"/>
+                </a:solidFill>
+              </a:rPr>
+              <a:t>Github:	http://github.com/ifandelse</a:t>
             </a:r>
           </a:p>
           <a:p>
@@ -6173,15 +6846,7 @@
                   <a:srgbClr val="242852"/>
                 </a:solidFill>
               </a:rPr>
-              <a:t>Well – I lied.  There are moments you need to </a:t>
-            </a:r>
-            <a:r>
-              <a:rPr lang="en-US" dirty="0" smtClean="0">
-                <a:solidFill>
-                  <a:srgbClr val="242852"/>
-                </a:solidFill>
-              </a:rPr>
-              <a:t>worry – but </a:t>
+              <a:t>Well – I lied.  There are moments you need to worry – but </a:t>
             </a:r>
             <a:r>
               <a:rPr lang="en-US" b="1" i="1" dirty="0" smtClean="0">
@@ -6191,11 +6856,6 @@
               </a:rPr>
               <a:t>they’re entirely up to you</a:t>
             </a:r>
-            <a:endParaRPr lang="en-US" b="1" i="1" dirty="0" smtClean="0">
-              <a:solidFill>
-                <a:srgbClr val="242852"/>
-              </a:solidFill>
-            </a:endParaRPr>
           </a:p>
         </p:txBody>
       </p:sp>
@@ -7452,7 +8112,7 @@
                             </p:stCondLst>
                             <p:childTnLst>
                               <p:par>
-                                <p:cTn id="13" presetID="9" presetClass="entr" presetSubtype="0" fill="hold" grpId="0" nodeType="clickEffect">
+                                <p:cTn id="13" presetID="1" presetClass="entr" presetSubtype="0" fill="hold" grpId="0" nodeType="clickEffect">
                                   <p:stCondLst>
                                     <p:cond delay="0"/>
                                   </p:stCondLst>
@@ -7475,14 +8135,6 @@
                                         <p:strVal val="visible"/>
                                       </p:to>
                                     </p:set>
-                                    <p:animEffect transition="in" filter="dissolve">
-                                      <p:cBhvr>
-                                        <p:cTn id="15" dur="500"/>
-                                        <p:tgtEl>
-                                          <p:spTgt spid="15"/>
-                                        </p:tgtEl>
-                                      </p:cBhvr>
-                                    </p:animEffect>
                                   </p:childTnLst>
                                 </p:cTn>
                               </p:par>
@@ -7493,26 +8145,26 @@
                     </p:cTn>
                   </p:par>
                   <p:par>
-                    <p:cTn id="16" fill="hold">
+                    <p:cTn id="15" fill="hold">
                       <p:stCondLst>
                         <p:cond delay="indefinite"/>
                       </p:stCondLst>
                       <p:childTnLst>
                         <p:par>
-                          <p:cTn id="17" fill="hold">
+                          <p:cTn id="16" fill="hold">
                             <p:stCondLst>
                               <p:cond delay="0"/>
                             </p:stCondLst>
                             <p:childTnLst>
                               <p:par>
-                                <p:cTn id="18" presetID="2" presetClass="entr" presetSubtype="8" fill="hold" grpId="0" nodeType="clickEffect">
+                                <p:cTn id="17" presetID="2" presetClass="entr" presetSubtype="8" fill="hold" grpId="0" nodeType="clickEffect">
                                   <p:stCondLst>
                                     <p:cond delay="0"/>
                                   </p:stCondLst>
                                   <p:childTnLst>
                                     <p:set>
                                       <p:cBhvr>
-                                        <p:cTn id="19" dur="1" fill="hold">
+                                        <p:cTn id="18" dur="1" fill="hold">
                                           <p:stCondLst>
                                             <p:cond delay="0"/>
                                           </p:stCondLst>
@@ -7530,7 +8182,7 @@
                                     </p:set>
                                     <p:anim calcmode="lin" valueType="num">
                                       <p:cBhvr additive="base">
-                                        <p:cTn id="20" dur="500" fill="hold"/>
+                                        <p:cTn id="19" dur="500" fill="hold"/>
                                         <p:tgtEl>
                                           <p:spTgt spid="16"/>
                                         </p:tgtEl>
@@ -7553,7 +8205,7 @@
                                     </p:anim>
                                     <p:anim calcmode="lin" valueType="num">
                                       <p:cBhvr additive="base">
-                                        <p:cTn id="21" dur="500" fill="hold"/>
+                                        <p:cTn id="20" dur="500" fill="hold"/>
                                         <p:tgtEl>
                                           <p:spTgt spid="16"/>
                                         </p:tgtEl>
@@ -7578,14 +8230,14 @@
                                 </p:cTn>
                               </p:par>
                               <p:par>
-                                <p:cTn id="22" presetID="2" presetClass="entr" presetSubtype="8" fill="hold" nodeType="withEffect">
+                                <p:cTn id="21" presetID="2" presetClass="entr" presetSubtype="8" fill="hold" nodeType="withEffect">
                                   <p:stCondLst>
                                     <p:cond delay="0"/>
                                   </p:stCondLst>
                                   <p:childTnLst>
                                     <p:set>
                                       <p:cBhvr>
-                                        <p:cTn id="23" dur="1" fill="hold">
+                                        <p:cTn id="22" dur="1" fill="hold">
                                           <p:stCondLst>
                                             <p:cond delay="0"/>
                                           </p:stCondLst>
@@ -7603,7 +8255,7 @@
                                     </p:set>
                                     <p:anim calcmode="lin" valueType="num">
                                       <p:cBhvr additive="base">
-                                        <p:cTn id="24" dur="500" fill="hold"/>
+                                        <p:cTn id="23" dur="500" fill="hold"/>
                                         <p:tgtEl>
                                           <p:spTgt spid="17"/>
                                         </p:tgtEl>
@@ -7626,7 +8278,7 @@
                                     </p:anim>
                                     <p:anim calcmode="lin" valueType="num">
                                       <p:cBhvr additive="base">
-                                        <p:cTn id="25" dur="500" fill="hold"/>
+                                        <p:cTn id="24" dur="500" fill="hold"/>
                                         <p:tgtEl>
                                           <p:spTgt spid="17"/>
                                         </p:tgtEl>
@@ -7651,14 +8303,14 @@
                                 </p:cTn>
                               </p:par>
                               <p:par>
-                                <p:cTn id="26" presetID="2" presetClass="entr" presetSubtype="8" fill="hold" grpId="0" nodeType="withEffect">
+                                <p:cTn id="25" presetID="2" presetClass="entr" presetSubtype="8" fill="hold" grpId="0" nodeType="withEffect">
                                   <p:stCondLst>
                                     <p:cond delay="0"/>
                                   </p:stCondLst>
                                   <p:childTnLst>
                                     <p:set>
                                       <p:cBhvr>
-                                        <p:cTn id="27" dur="1" fill="hold">
+                                        <p:cTn id="26" dur="1" fill="hold">
                                           <p:stCondLst>
                                             <p:cond delay="0"/>
                                           </p:stCondLst>
@@ -7676,7 +8328,7 @@
                                     </p:set>
                                     <p:anim calcmode="lin" valueType="num">
                                       <p:cBhvr additive="base">
-                                        <p:cTn id="28" dur="500" fill="hold"/>
+                                        <p:cTn id="27" dur="500" fill="hold"/>
                                         <p:tgtEl>
                                           <p:spTgt spid="18"/>
                                         </p:tgtEl>
@@ -7699,7 +8351,7 @@
                                     </p:anim>
                                     <p:anim calcmode="lin" valueType="num">
                                       <p:cBhvr additive="base">
-                                        <p:cTn id="29" dur="500" fill="hold"/>
+                                        <p:cTn id="28" dur="500" fill="hold"/>
                                         <p:tgtEl>
                                           <p:spTgt spid="18"/>
                                         </p:tgtEl>
@@ -7730,26 +8382,26 @@
                     </p:cTn>
                   </p:par>
                   <p:par>
-                    <p:cTn id="30" fill="hold">
+                    <p:cTn id="29" fill="hold">
                       <p:stCondLst>
                         <p:cond delay="indefinite"/>
                       </p:stCondLst>
                       <p:childTnLst>
                         <p:par>
-                          <p:cTn id="31" fill="hold">
+                          <p:cTn id="30" fill="hold">
                             <p:stCondLst>
                               <p:cond delay="0"/>
                             </p:stCondLst>
                             <p:childTnLst>
                               <p:par>
-                                <p:cTn id="32" presetID="1" presetClass="entr" presetSubtype="0" fill="hold" grpId="0" nodeType="clickEffect">
+                                <p:cTn id="31" presetID="1" presetClass="entr" presetSubtype="0" fill="hold" grpId="0" nodeType="clickEffect">
                                   <p:stCondLst>
                                     <p:cond delay="0"/>
                                   </p:stCondLst>
                                   <p:childTnLst>
                                     <p:set>
                                       <p:cBhvr>
-                                        <p:cTn id="33" dur="1" fill="hold">
+                                        <p:cTn id="32" dur="1" fill="hold">
                                           <p:stCondLst>
                                             <p:cond delay="0"/>
                                           </p:stCondLst>
@@ -7769,14 +8421,14 @@
                                 </p:cTn>
                               </p:par>
                               <p:par>
-                                <p:cTn id="34" presetID="1" presetClass="entr" presetSubtype="0" fill="hold" nodeType="withEffect">
+                                <p:cTn id="33" presetID="1" presetClass="entr" presetSubtype="0" fill="hold" nodeType="withEffect">
                                   <p:stCondLst>
                                     <p:cond delay="0"/>
                                   </p:stCondLst>
                                   <p:childTnLst>
                                     <p:set>
                                       <p:cBhvr>
-                                        <p:cTn id="35" dur="1" fill="hold">
+                                        <p:cTn id="34" dur="1" fill="hold">
                                           <p:stCondLst>
                                             <p:cond delay="0"/>
                                           </p:stCondLst>
@@ -7796,14 +8448,14 @@
                                 </p:cTn>
                               </p:par>
                               <p:par>
-                                <p:cTn id="36" presetID="1" presetClass="entr" presetSubtype="0" fill="hold" grpId="0" nodeType="withEffect">
+                                <p:cTn id="35" presetID="1" presetClass="entr" presetSubtype="0" fill="hold" grpId="0" nodeType="withEffect">
                                   <p:stCondLst>
                                     <p:cond delay="0"/>
                                   </p:stCondLst>
                                   <p:childTnLst>
                                     <p:set>
                                       <p:cBhvr>
-                                        <p:cTn id="37" dur="1" fill="hold">
+                                        <p:cTn id="36" dur="1" fill="hold">
                                           <p:stCondLst>
                                             <p:cond delay="0"/>
                                           </p:stCondLst>
@@ -7829,26 +8481,26 @@
                     </p:cTn>
                   </p:par>
                   <p:par>
-                    <p:cTn id="38" fill="hold">
+                    <p:cTn id="37" fill="hold">
                       <p:stCondLst>
                         <p:cond delay="indefinite"/>
                       </p:stCondLst>
                       <p:childTnLst>
                         <p:par>
-                          <p:cTn id="39" fill="hold">
+                          <p:cTn id="38" fill="hold">
                             <p:stCondLst>
                               <p:cond delay="0"/>
                             </p:stCondLst>
                             <p:childTnLst>
                               <p:par>
-                                <p:cTn id="40" presetID="1" presetClass="exit" presetSubtype="0" fill="hold" grpId="1" nodeType="clickEffect">
+                                <p:cTn id="39" presetID="1" presetClass="exit" presetSubtype="0" fill="hold" grpId="1" nodeType="clickEffect">
                                   <p:stCondLst>
                                     <p:cond delay="0"/>
                                   </p:stCondLst>
                                   <p:childTnLst>
                                     <p:set>
                                       <p:cBhvr>
-                                        <p:cTn id="41" dur="1" fill="hold">
+                                        <p:cTn id="40" dur="1" fill="hold">
                                           <p:stCondLst>
                                             <p:cond delay="0"/>
                                           </p:stCondLst>
@@ -7874,26 +8526,26 @@
                     </p:cTn>
                   </p:par>
                   <p:par>
-                    <p:cTn id="42" fill="hold">
+                    <p:cTn id="41" fill="hold">
                       <p:stCondLst>
                         <p:cond delay="indefinite"/>
                       </p:stCondLst>
                       <p:childTnLst>
                         <p:par>
-                          <p:cTn id="43" fill="hold">
+                          <p:cTn id="42" fill="hold">
                             <p:stCondLst>
                               <p:cond delay="0"/>
                             </p:stCondLst>
                             <p:childTnLst>
                               <p:par>
-                                <p:cTn id="44" presetID="1" presetClass="entr" presetSubtype="0" fill="hold" grpId="0" nodeType="clickEffect">
+                                <p:cTn id="43" presetID="1" presetClass="entr" presetSubtype="0" fill="hold" grpId="0" nodeType="clickEffect">
                                   <p:stCondLst>
                                     <p:cond delay="0"/>
                                   </p:stCondLst>
                                   <p:childTnLst>
                                     <p:set>
                                       <p:cBhvr>
-                                        <p:cTn id="45" dur="1" fill="hold">
+                                        <p:cTn id="44" dur="1" fill="hold">
                                           <p:stCondLst>
                                             <p:cond delay="0"/>
                                           </p:stCondLst>
@@ -7919,26 +8571,26 @@
                     </p:cTn>
                   </p:par>
                   <p:par>
-                    <p:cTn id="46" fill="hold">
+                    <p:cTn id="45" fill="hold">
                       <p:stCondLst>
                         <p:cond delay="indefinite"/>
                       </p:stCondLst>
                       <p:childTnLst>
                         <p:par>
-                          <p:cTn id="47" fill="hold">
+                          <p:cTn id="46" fill="hold">
                             <p:stCondLst>
                               <p:cond delay="0"/>
                             </p:stCondLst>
                             <p:childTnLst>
                               <p:par>
-                                <p:cTn id="48" presetID="2" presetClass="entr" presetSubtype="8" fill="hold" grpId="0" nodeType="clickEffect">
+                                <p:cTn id="47" presetID="2" presetClass="entr" presetSubtype="8" fill="hold" grpId="0" nodeType="clickEffect">
                                   <p:stCondLst>
                                     <p:cond delay="0"/>
                                   </p:stCondLst>
                                   <p:childTnLst>
                                     <p:set>
                                       <p:cBhvr>
-                                        <p:cTn id="49" dur="1" fill="hold">
+                                        <p:cTn id="48" dur="1" fill="hold">
                                           <p:stCondLst>
                                             <p:cond delay="0"/>
                                           </p:stCondLst>
@@ -7956,7 +8608,7 @@
                                     </p:set>
                                     <p:anim calcmode="lin" valueType="num">
                                       <p:cBhvr additive="base">
-                                        <p:cTn id="50" dur="500" fill="hold"/>
+                                        <p:cTn id="49" dur="500" fill="hold"/>
                                         <p:tgtEl>
                                           <p:spTgt spid="20"/>
                                         </p:tgtEl>
@@ -7979,7 +8631,7 @@
                                     </p:anim>
                                     <p:anim calcmode="lin" valueType="num">
                                       <p:cBhvr additive="base">
-                                        <p:cTn id="51" dur="500" fill="hold"/>
+                                        <p:cTn id="50" dur="500" fill="hold"/>
                                         <p:tgtEl>
                                           <p:spTgt spid="20"/>
                                         </p:tgtEl>
@@ -8004,14 +8656,14 @@
                                 </p:cTn>
                               </p:par>
                               <p:par>
-                                <p:cTn id="52" presetID="2" presetClass="entr" presetSubtype="8" fill="hold" grpId="0" nodeType="withEffect">
+                                <p:cTn id="51" presetID="2" presetClass="entr" presetSubtype="8" fill="hold" grpId="0" nodeType="withEffect">
                                   <p:stCondLst>
                                     <p:cond delay="0"/>
                                   </p:stCondLst>
                                   <p:childTnLst>
                                     <p:set>
                                       <p:cBhvr>
-                                        <p:cTn id="53" dur="1" fill="hold">
+                                        <p:cTn id="52" dur="1" fill="hold">
                                           <p:stCondLst>
                                             <p:cond delay="0"/>
                                           </p:stCondLst>
@@ -8029,7 +8681,7 @@
                                     </p:set>
                                     <p:anim calcmode="lin" valueType="num">
                                       <p:cBhvr additive="base">
-                                        <p:cTn id="54" dur="500" fill="hold"/>
+                                        <p:cTn id="53" dur="500" fill="hold"/>
                                         <p:tgtEl>
                                           <p:spTgt spid="22"/>
                                         </p:tgtEl>
@@ -8052,7 +8704,7 @@
                                     </p:anim>
                                     <p:anim calcmode="lin" valueType="num">
                                       <p:cBhvr additive="base">
-                                        <p:cTn id="55" dur="500" fill="hold"/>
+                                        <p:cTn id="54" dur="500" fill="hold"/>
                                         <p:tgtEl>
                                           <p:spTgt spid="22"/>
                                         </p:tgtEl>
@@ -8077,14 +8729,14 @@
                                 </p:cTn>
                               </p:par>
                               <p:par>
-                                <p:cTn id="56" presetID="2" presetClass="entr" presetSubtype="8" fill="hold" nodeType="withEffect">
+                                <p:cTn id="55" presetID="2" presetClass="entr" presetSubtype="8" fill="hold" nodeType="withEffect">
                                   <p:stCondLst>
                                     <p:cond delay="0"/>
                                   </p:stCondLst>
                                   <p:childTnLst>
                                     <p:set>
                                       <p:cBhvr>
-                                        <p:cTn id="57" dur="1" fill="hold">
+                                        <p:cTn id="56" dur="1" fill="hold">
                                           <p:stCondLst>
                                             <p:cond delay="0"/>
                                           </p:stCondLst>
@@ -8102,7 +8754,7 @@
                                     </p:set>
                                     <p:anim calcmode="lin" valueType="num">
                                       <p:cBhvr additive="base">
-                                        <p:cTn id="58" dur="500" fill="hold"/>
+                                        <p:cTn id="57" dur="500" fill="hold"/>
                                         <p:tgtEl>
                                           <p:spTgt spid="21"/>
                                         </p:tgtEl>
@@ -8125,7 +8777,7 @@
                                     </p:anim>
                                     <p:anim calcmode="lin" valueType="num">
                                       <p:cBhvr additive="base">
-                                        <p:cTn id="59" dur="500" fill="hold"/>
+                                        <p:cTn id="58" dur="500" fill="hold"/>
                                         <p:tgtEl>
                                           <p:spTgt spid="21"/>
                                         </p:tgtEl>
@@ -8156,26 +8808,26 @@
                     </p:cTn>
                   </p:par>
                   <p:par>
-                    <p:cTn id="60" fill="hold">
+                    <p:cTn id="59" fill="hold">
                       <p:stCondLst>
                         <p:cond delay="indefinite"/>
                       </p:stCondLst>
                       <p:childTnLst>
                         <p:par>
-                          <p:cTn id="61" fill="hold">
+                          <p:cTn id="60" fill="hold">
                             <p:stCondLst>
                               <p:cond delay="0"/>
                             </p:stCondLst>
                             <p:childTnLst>
                               <p:par>
-                                <p:cTn id="62" presetID="1" presetClass="entr" presetSubtype="0" fill="hold" grpId="0" nodeType="clickEffect">
+                                <p:cTn id="61" presetID="1" presetClass="entr" presetSubtype="0" fill="hold" grpId="0" nodeType="clickEffect">
                                   <p:stCondLst>
                                     <p:cond delay="0"/>
                                   </p:stCondLst>
                                   <p:childTnLst>
                                     <p:set>
                                       <p:cBhvr>
-                                        <p:cTn id="63" dur="1" fill="hold">
+                                        <p:cTn id="62" dur="1" fill="hold">
                                           <p:stCondLst>
                                             <p:cond delay="0"/>
                                           </p:stCondLst>
@@ -8324,7 +8976,6 @@
               <a:rPr lang="en-US" sz="3600" dirty="0" smtClean="0"/>
               <a:t>Web Worker Abstractions</a:t>
             </a:r>
-            <a:endParaRPr lang="en-US" sz="3600" dirty="0" smtClean="0"/>
           </a:p>
           <a:p>
             <a:r>
@@ -8506,24 +9157,19 @@
               <a:t>JavaScript in </a:t>
             </a:r>
             <a:r>
-              <a:rPr lang="en-US" sz="2000" dirty="0" err="1" smtClean="0"/>
-              <a:t>node.js</a:t>
-            </a:r>
-            <a:endParaRPr lang="en-US" sz="2000" dirty="0" smtClean="0"/>
+              <a:rPr lang="en-US" sz="2000" dirty="0"/>
+              <a:t>N</a:t>
+            </a:r>
+            <a:r>
+              <a:rPr lang="en-US" sz="2000" dirty="0" smtClean="0"/>
+              <a:t>ode.js</a:t>
+            </a:r>
           </a:p>
           <a:p>
             <a:pPr lvl="1"/>
             <a:r>
               <a:rPr lang="en-US" sz="1800" dirty="0" smtClean="0"/>
-              <a:t>Global scope is different – module concept is enforced with </a:t>
-            </a:r>
-            <a:r>
-              <a:rPr lang="en-US" sz="1800" dirty="0" err="1" smtClean="0"/>
-              <a:t>CommonJS</a:t>
-            </a:r>
-            <a:r>
-              <a:rPr lang="en-US" sz="1800" dirty="0" smtClean="0"/>
-              <a:t> API standards</a:t>
+              <a:t>Global scope is different – module concept is enforced with CommonJS API standards</a:t>
             </a:r>
             <a:endParaRPr lang="en-US" sz="1800" dirty="0"/>
           </a:p>
@@ -8565,13 +9211,8 @@
           <a:p>
             <a:r>
               <a:rPr lang="en-US" sz="2000" dirty="0" smtClean="0"/>
-              <a:t>Oh – and you can use </a:t>
-            </a:r>
-            <a:r>
-              <a:rPr lang="en-US" sz="2000" dirty="0" err="1" smtClean="0"/>
-              <a:t>CoffeeScript</a:t>
-            </a:r>
-            <a:endParaRPr lang="en-US" sz="2000" dirty="0" smtClean="0"/>
+              <a:t>Oh – and you can use CoffeeScript</a:t>
+            </a:r>
           </a:p>
         </p:txBody>
       </p:sp>
@@ -8742,7 +9383,7 @@
           <p:nvPr/>
         </p:nvPicPr>
         <p:blipFill>
-          <a:blip r:embed="rId2"/>
+          <a:blip r:embed="rId3"/>
           <a:stretch>
             <a:fillRect/>
           </a:stretch>
@@ -9744,6 +10385,20 @@
             </a:r>
           </a:p>
           <a:p>
+            <a:r>
+              <a:rPr lang="en-US" dirty="0" smtClean="0"/>
+              <a:t>Cradle – </a:t>
+            </a:r>
+            <a:r>
+              <a:rPr lang="en-US" dirty="0" err="1" smtClean="0"/>
+              <a:t>Couchbase</a:t>
+            </a:r>
+            <a:r>
+              <a:rPr lang="en-US" dirty="0" smtClean="0"/>
+              <a:t> client for Node</a:t>
+            </a:r>
+          </a:p>
+          <a:p>
             <a:endParaRPr lang="en-US" dirty="0"/>
           </a:p>
         </p:txBody>
@@ -10298,13 +10953,37 @@
             </a:br>
             <a:r>
               <a:rPr lang="en-US" sz="1600" dirty="0">
-                <a:hlinkClick r:id="rId2"/>
+                <a:hlinkClick r:id="rId3"/>
               </a:rPr>
-              <a:t>https://github.com/ashbylane/DevLink-2011---Getting-Started-With-</a:t>
+              <a:t>https://github.com</a:t>
             </a:r>
             <a:r>
               <a:rPr lang="en-US" sz="1600" dirty="0" smtClean="0">
-                <a:hlinkClick r:id="rId2"/>
+                <a:hlinkClick r:id="rId3"/>
+              </a:rPr>
+              <a:t>/</a:t>
+            </a:r>
+            <a:r>
+              <a:rPr lang="en-US" sz="1600" dirty="0" smtClean="0">
+                <a:hlinkClick r:id="rId3"/>
+              </a:rPr>
+              <a:t>ifandelse</a:t>
+            </a:r>
+            <a:r>
+              <a:rPr lang="en-US" sz="1600" dirty="0" smtClean="0">
+                <a:hlinkClick r:id="rId3"/>
+              </a:rPr>
+              <a:t>/</a:t>
+            </a:r>
+            <a:r>
+              <a:rPr lang="en-US" sz="1600" dirty="0">
+                <a:hlinkClick r:id="rId3"/>
+              </a:rPr>
+              <a:t>DevLink-2011---Getting-Started-With-</a:t>
+            </a:r>
+            <a:r>
+              <a:rPr lang="en-US" sz="1600" dirty="0" smtClean="0">
+                <a:hlinkClick r:id="rId3"/>
               </a:rPr>
               <a:t>Nodejs</a:t>
             </a:r>

</xml_diff>

<commit_message>
Apparently more ppt updates
</commit_message>
<xml_diff>
--- a/PowerPoint/GettingStartedWithNodejs.pptx
+++ b/PowerPoint/GettingStartedWithNodejs.pptx
@@ -10993,6 +10993,10 @@
             <a:pPr marL="114300" indent="0" algn="ctr">
               <a:buNone/>
             </a:pPr>
+            <a:r>
+              <a:rPr lang="en-US" sz="1600" dirty="0" smtClean="0"/>
+              <a:t>	</a:t>
+            </a:r>
             <a:endParaRPr lang="en-US" sz="1600" dirty="0"/>
           </a:p>
         </p:txBody>

</xml_diff>